<commit_message>
Merge de los PPT de Angular
Tomé el PPT que hizo Martin + el qeu hizo Tatiana y los junté en el PPT
llamado AngularJs - Clase 1. Hay que verificar que los archivos que usé
eran la última versión.
</commit_message>
<xml_diff>
--- a/PPTS/AngularJS - Clase 1.pptx
+++ b/PPTS/AngularJS - Clase 1.pptx
@@ -31,23 +31,23 @@
     <p:sldId id="325" r:id="rId22"/>
     <p:sldId id="326" r:id="rId23"/>
     <p:sldId id="327" r:id="rId24"/>
-    <p:sldId id="328" r:id="rId25"/>
-    <p:sldId id="329" r:id="rId26"/>
-    <p:sldId id="330" r:id="rId27"/>
-    <p:sldId id="331" r:id="rId28"/>
-    <p:sldId id="332" r:id="rId29"/>
-    <p:sldId id="333" r:id="rId30"/>
-    <p:sldId id="334" r:id="rId31"/>
-    <p:sldId id="335" r:id="rId32"/>
-    <p:sldId id="336" r:id="rId33"/>
-    <p:sldId id="337" r:id="rId34"/>
-    <p:sldId id="338" r:id="rId35"/>
-    <p:sldId id="339" r:id="rId36"/>
-    <p:sldId id="340" r:id="rId37"/>
-    <p:sldId id="341" r:id="rId38"/>
-    <p:sldId id="342" r:id="rId39"/>
-    <p:sldId id="343" r:id="rId40"/>
-    <p:sldId id="344" r:id="rId41"/>
+    <p:sldId id="373" r:id="rId25"/>
+    <p:sldId id="374" r:id="rId26"/>
+    <p:sldId id="375" r:id="rId27"/>
+    <p:sldId id="376" r:id="rId28"/>
+    <p:sldId id="377" r:id="rId29"/>
+    <p:sldId id="378" r:id="rId30"/>
+    <p:sldId id="379" r:id="rId31"/>
+    <p:sldId id="380" r:id="rId32"/>
+    <p:sldId id="381" r:id="rId33"/>
+    <p:sldId id="382" r:id="rId34"/>
+    <p:sldId id="383" r:id="rId35"/>
+    <p:sldId id="384" r:id="rId36"/>
+    <p:sldId id="385" r:id="rId37"/>
+    <p:sldId id="386" r:id="rId38"/>
+    <p:sldId id="387" r:id="rId39"/>
+    <p:sldId id="388" r:id="rId40"/>
+    <p:sldId id="389" r:id="rId41"/>
     <p:sldId id="346" r:id="rId42"/>
     <p:sldId id="347" r:id="rId43"/>
     <p:sldId id="348" r:id="rId44"/>
@@ -627,2008 +627,6 @@
 </p:notes>
 </file>
 
-<file path=ppt/notesSlides/notesSlide10.xml><?xml version="1.0" encoding="utf-8"?>
-<p:notes xmlns:a="http://schemas.openxmlformats.org/drawingml/2006/main" xmlns:r="http://schemas.openxmlformats.org/officeDocument/2006/relationships" xmlns:p="http://schemas.openxmlformats.org/presentationml/2006/main">
-  <p:cSld>
-    <p:spTree>
-      <p:nvGrpSpPr>
-        <p:cNvPr id="1" name=""/>
-        <p:cNvGrpSpPr/>
-        <p:nvPr/>
-      </p:nvGrpSpPr>
-      <p:grpSpPr>
-        <a:xfrm>
-          <a:off x="0" y="0"/>
-          <a:ext cx="0" cy="0"/>
-          <a:chOff x="0" y="0"/>
-          <a:chExt cx="0" cy="0"/>
-        </a:xfrm>
-      </p:grpSpPr>
-      <p:sp>
-        <p:nvSpPr>
-          <p:cNvPr id="2" name="Slide Image Placeholder 1"/>
-          <p:cNvSpPr>
-            <a:spLocks noGrp="1" noRot="1" noChangeAspect="1"/>
-          </p:cNvSpPr>
-          <p:nvPr>
-            <p:ph type="sldImg"/>
-          </p:nvPr>
-        </p:nvSpPr>
-        <p:spPr/>
-      </p:sp>
-      <p:sp>
-        <p:nvSpPr>
-          <p:cNvPr id="3" name="Notes Placeholder 2"/>
-          <p:cNvSpPr>
-            <a:spLocks noGrp="1"/>
-          </p:cNvSpPr>
-          <p:nvPr>
-            <p:ph type="body" idx="1"/>
-          </p:nvPr>
-        </p:nvSpPr>
-        <p:spPr/>
-        <p:txBody>
-          <a:bodyPr/>
-          <a:lstStyle/>
-          <a:p>
-            <a:r>
-              <a:rPr lang="en-US" dirty="0" err="1" smtClean="0"/>
-              <a:t>Desde</a:t>
-            </a:r>
-            <a:r>
-              <a:rPr lang="en-US" dirty="0" smtClean="0"/>
-              <a:t> </a:t>
-            </a:r>
-            <a:r>
-              <a:rPr lang="en-US" dirty="0" err="1" smtClean="0"/>
-              <a:t>nuestro</a:t>
-            </a:r>
-            <a:r>
-              <a:rPr lang="en-US" dirty="0" smtClean="0"/>
-              <a:t> </a:t>
-            </a:r>
-            <a:r>
-              <a:rPr lang="en-US" dirty="0" err="1" smtClean="0"/>
-              <a:t>codigo</a:t>
-            </a:r>
-            <a:r>
-              <a:rPr lang="en-US" dirty="0" smtClean="0"/>
-              <a:t> </a:t>
-            </a:r>
-            <a:r>
-              <a:rPr lang="en-US" dirty="0" err="1" smtClean="0"/>
-              <a:t>javascript</a:t>
-            </a:r>
-            <a:r>
-              <a:rPr lang="en-US" dirty="0" smtClean="0"/>
-              <a:t> </a:t>
-            </a:r>
-            <a:r>
-              <a:rPr lang="en-US" dirty="0" err="1" smtClean="0"/>
-              <a:t>tambien</a:t>
-            </a:r>
-            <a:r>
-              <a:rPr lang="en-US" dirty="0" smtClean="0"/>
-              <a:t> </a:t>
-            </a:r>
-            <a:r>
-              <a:rPr lang="en-US" dirty="0" err="1" smtClean="0"/>
-              <a:t>podemos</a:t>
-            </a:r>
-            <a:r>
-              <a:rPr lang="en-US" dirty="0" smtClean="0"/>
-              <a:t> </a:t>
-            </a:r>
-            <a:r>
-              <a:rPr lang="en-US" dirty="0" err="1" smtClean="0"/>
-              <a:t>aplicar</a:t>
-            </a:r>
-            <a:r>
-              <a:rPr lang="en-US" dirty="0" smtClean="0"/>
-              <a:t> los </a:t>
-            </a:r>
-            <a:r>
-              <a:rPr lang="en-US" dirty="0" err="1" smtClean="0"/>
-              <a:t>mismos</a:t>
-            </a:r>
-            <a:r>
-              <a:rPr lang="en-US" dirty="0" smtClean="0"/>
-              <a:t> </a:t>
-            </a:r>
-            <a:r>
-              <a:rPr lang="en-US" dirty="0" err="1" smtClean="0"/>
-              <a:t>filtros</a:t>
-            </a:r>
-            <a:r>
-              <a:rPr lang="en-US" dirty="0" smtClean="0"/>
-              <a:t> </a:t>
-            </a:r>
-            <a:r>
-              <a:rPr lang="en-US" dirty="0" err="1" smtClean="0"/>
-              <a:t>que</a:t>
-            </a:r>
-            <a:r>
-              <a:rPr lang="en-US" dirty="0" smtClean="0"/>
-              <a:t> </a:t>
-            </a:r>
-            <a:r>
-              <a:rPr lang="en-US" dirty="0" err="1" smtClean="0"/>
-              <a:t>en</a:t>
-            </a:r>
-            <a:r>
-              <a:rPr lang="en-US" dirty="0" smtClean="0"/>
-              <a:t> html.</a:t>
-            </a:r>
-          </a:p>
-          <a:p>
-            <a:r>
-              <a:rPr lang="en-US" dirty="0" smtClean="0"/>
-              <a:t>La </a:t>
-            </a:r>
-            <a:r>
-              <a:rPr lang="en-US" dirty="0" err="1" smtClean="0"/>
-              <a:t>sintaxis</a:t>
-            </a:r>
-            <a:r>
-              <a:rPr lang="en-US" baseline="0" dirty="0" smtClean="0"/>
-              <a:t> </a:t>
-            </a:r>
-            <a:r>
-              <a:rPr lang="en-US" baseline="0" dirty="0" err="1" smtClean="0"/>
-              <a:t>es</a:t>
-            </a:r>
-            <a:r>
-              <a:rPr lang="en-US" baseline="0" dirty="0" smtClean="0"/>
-              <a:t>:</a:t>
-            </a:r>
-          </a:p>
-          <a:p>
-            <a:r>
-              <a:rPr lang="en-US" baseline="0" dirty="0" smtClean="0"/>
-              <a:t>$filter </a:t>
-            </a:r>
-            <a:r>
-              <a:rPr lang="en-US" baseline="0" dirty="0" err="1" smtClean="0"/>
-              <a:t>pasando</a:t>
-            </a:r>
-            <a:r>
-              <a:rPr lang="en-US" baseline="0" dirty="0" smtClean="0"/>
-              <a:t> el </a:t>
-            </a:r>
-            <a:r>
-              <a:rPr lang="en-US" baseline="0" dirty="0" err="1" smtClean="0"/>
-              <a:t>nombre</a:t>
-            </a:r>
-            <a:r>
-              <a:rPr lang="en-US" baseline="0" dirty="0" smtClean="0"/>
-              <a:t> del </a:t>
-            </a:r>
-            <a:r>
-              <a:rPr lang="en-US" baseline="0" dirty="0" err="1" smtClean="0"/>
-              <a:t>filtro</a:t>
-            </a:r>
-            <a:r>
-              <a:rPr lang="en-US" baseline="0" dirty="0" smtClean="0"/>
-              <a:t> </a:t>
-            </a:r>
-            <a:r>
-              <a:rPr lang="en-US" baseline="0" dirty="0" err="1" smtClean="0"/>
-              <a:t>como</a:t>
-            </a:r>
-            <a:r>
-              <a:rPr lang="en-US" baseline="0" dirty="0" smtClean="0"/>
-              <a:t> </a:t>
-            </a:r>
-            <a:r>
-              <a:rPr lang="en-US" baseline="0" dirty="0" err="1" smtClean="0"/>
-              <a:t>parametro</a:t>
-            </a:r>
-            <a:r>
-              <a:rPr lang="en-US" baseline="0" dirty="0" smtClean="0"/>
-              <a:t> y los </a:t>
-            </a:r>
-            <a:r>
-              <a:rPr lang="en-US" baseline="0" dirty="0" err="1" smtClean="0"/>
-              <a:t>datos</a:t>
-            </a:r>
-            <a:r>
-              <a:rPr lang="en-US" baseline="0" dirty="0" smtClean="0"/>
-              <a:t> y </a:t>
-            </a:r>
-            <a:r>
-              <a:rPr lang="en-US" baseline="0" dirty="0" err="1" smtClean="0"/>
-              <a:t>parametros</a:t>
-            </a:r>
-            <a:r>
-              <a:rPr lang="en-US" baseline="0" dirty="0" smtClean="0"/>
-              <a:t> </a:t>
-            </a:r>
-            <a:r>
-              <a:rPr lang="en-US" baseline="0" dirty="0" err="1" smtClean="0"/>
-              <a:t>propios</a:t>
-            </a:r>
-            <a:r>
-              <a:rPr lang="en-US" baseline="0" dirty="0" smtClean="0"/>
-              <a:t> del </a:t>
-            </a:r>
-            <a:r>
-              <a:rPr lang="en-US" baseline="0" dirty="0" err="1" smtClean="0"/>
-              <a:t>filtro</a:t>
-            </a:r>
-            <a:r>
-              <a:rPr lang="en-US" baseline="0" dirty="0" smtClean="0"/>
-              <a:t>.</a:t>
-            </a:r>
-            <a:endParaRPr lang="es-AR" dirty="0" smtClean="0"/>
-          </a:p>
-          <a:p>
-            <a:endParaRPr lang="es-AR" dirty="0"/>
-          </a:p>
-        </p:txBody>
-      </p:sp>
-      <p:sp>
-        <p:nvSpPr>
-          <p:cNvPr id="4" name="Slide Number Placeholder 3"/>
-          <p:cNvSpPr>
-            <a:spLocks noGrp="1"/>
-          </p:cNvSpPr>
-          <p:nvPr>
-            <p:ph type="sldNum" sz="quarter" idx="10"/>
-          </p:nvPr>
-        </p:nvSpPr>
-        <p:spPr/>
-        <p:txBody>
-          <a:bodyPr/>
-          <a:lstStyle/>
-          <a:p>
-            <a:fld id="{7D61118C-0B68-45A8-8791-420E0DB4DDEA}" type="slidenum">
-              <a:rPr lang="es-AR" smtClean="0"/>
-              <a:t>31</a:t>
-            </a:fld>
-            <a:endParaRPr lang="es-AR"/>
-          </a:p>
-        </p:txBody>
-      </p:sp>
-    </p:spTree>
-    <p:extLst>
-      <p:ext uri="{BB962C8B-B14F-4D97-AF65-F5344CB8AC3E}">
-        <p14:creationId xmlns:p14="http://schemas.microsoft.com/office/powerpoint/2010/main" val="2047108645"/>
-      </p:ext>
-    </p:extLst>
-  </p:cSld>
-  <p:clrMapOvr>
-    <a:masterClrMapping/>
-  </p:clrMapOvr>
-</p:notes>
-</file>
-
-<file path=ppt/notesSlides/notesSlide11.xml><?xml version="1.0" encoding="utf-8"?>
-<p:notes xmlns:a="http://schemas.openxmlformats.org/drawingml/2006/main" xmlns:r="http://schemas.openxmlformats.org/officeDocument/2006/relationships" xmlns:p="http://schemas.openxmlformats.org/presentationml/2006/main">
-  <p:cSld>
-    <p:spTree>
-      <p:nvGrpSpPr>
-        <p:cNvPr id="1" name=""/>
-        <p:cNvGrpSpPr/>
-        <p:nvPr/>
-      </p:nvGrpSpPr>
-      <p:grpSpPr>
-        <a:xfrm>
-          <a:off x="0" y="0"/>
-          <a:ext cx="0" cy="0"/>
-          <a:chOff x="0" y="0"/>
-          <a:chExt cx="0" cy="0"/>
-        </a:xfrm>
-      </p:grpSpPr>
-      <p:sp>
-        <p:nvSpPr>
-          <p:cNvPr id="2" name="Slide Image Placeholder 1"/>
-          <p:cNvSpPr>
-            <a:spLocks noGrp="1" noRot="1" noChangeAspect="1"/>
-          </p:cNvSpPr>
-          <p:nvPr>
-            <p:ph type="sldImg"/>
-          </p:nvPr>
-        </p:nvSpPr>
-        <p:spPr/>
-      </p:sp>
-      <p:sp>
-        <p:nvSpPr>
-          <p:cNvPr id="3" name="Notes Placeholder 2"/>
-          <p:cNvSpPr>
-            <a:spLocks noGrp="1"/>
-          </p:cNvSpPr>
-          <p:nvPr>
-            <p:ph type="body" idx="1"/>
-          </p:nvPr>
-        </p:nvSpPr>
-        <p:spPr/>
-        <p:txBody>
-          <a:bodyPr/>
-          <a:lstStyle/>
-          <a:p>
-            <a:pPr marL="0" marR="0" indent="0" algn="l" defTabSz="914400" rtl="0" eaLnBrk="1" fontAlgn="auto" latinLnBrk="0" hangingPunct="1">
-              <a:lnSpc>
-                <a:spcPct val="100000"/>
-              </a:lnSpc>
-              <a:spcBef>
-                <a:spcPts val="0"/>
-              </a:spcBef>
-              <a:spcAft>
-                <a:spcPts val="0"/>
-              </a:spcAft>
-              <a:buClrTx/>
-              <a:buSzTx/>
-              <a:buFontTx/>
-              <a:buNone/>
-              <a:tabLst/>
-              <a:defRPr/>
-            </a:pPr>
-            <a:r>
-              <a:rPr lang="en-US" dirty="0" err="1" smtClean="0"/>
-              <a:t>Ejemplo</a:t>
-            </a:r>
-            <a:r>
-              <a:rPr lang="en-US" dirty="0" smtClean="0"/>
-              <a:t> de uppercase</a:t>
-            </a:r>
-            <a:r>
-              <a:rPr lang="en-US" baseline="0" dirty="0" smtClean="0"/>
-              <a:t> </a:t>
-            </a:r>
-            <a:r>
-              <a:rPr lang="en-US" baseline="0" dirty="0" err="1" smtClean="0"/>
-              <a:t>llamado</a:t>
-            </a:r>
-            <a:r>
-              <a:rPr lang="en-US" baseline="0" dirty="0" smtClean="0"/>
-              <a:t> </a:t>
-            </a:r>
-            <a:r>
-              <a:rPr lang="en-US" baseline="0" dirty="0" err="1" smtClean="0"/>
-              <a:t>desde</a:t>
-            </a:r>
-            <a:r>
-              <a:rPr lang="en-US" baseline="0" dirty="0" smtClean="0"/>
-              <a:t> un controller, </a:t>
-            </a:r>
-            <a:r>
-              <a:rPr lang="en-US" baseline="0" dirty="0" err="1" smtClean="0"/>
-              <a:t>por</a:t>
-            </a:r>
-            <a:r>
-              <a:rPr lang="en-US" baseline="0" dirty="0" smtClean="0"/>
-              <a:t> </a:t>
-            </a:r>
-            <a:r>
-              <a:rPr lang="en-US" baseline="0" dirty="0" err="1" smtClean="0"/>
-              <a:t>ejemplo</a:t>
-            </a:r>
-            <a:r>
-              <a:rPr lang="en-US" baseline="0" dirty="0" smtClean="0"/>
-              <a:t>.</a:t>
-            </a:r>
-            <a:endParaRPr lang="es-AR" dirty="0" smtClean="0"/>
-          </a:p>
-          <a:p>
-            <a:endParaRPr lang="es-AR" dirty="0"/>
-          </a:p>
-        </p:txBody>
-      </p:sp>
-      <p:sp>
-        <p:nvSpPr>
-          <p:cNvPr id="4" name="Slide Number Placeholder 3"/>
-          <p:cNvSpPr>
-            <a:spLocks noGrp="1"/>
-          </p:cNvSpPr>
-          <p:nvPr>
-            <p:ph type="sldNum" sz="quarter" idx="10"/>
-          </p:nvPr>
-        </p:nvSpPr>
-        <p:spPr/>
-        <p:txBody>
-          <a:bodyPr/>
-          <a:lstStyle/>
-          <a:p>
-            <a:fld id="{7D61118C-0B68-45A8-8791-420E0DB4DDEA}" type="slidenum">
-              <a:rPr lang="es-AR" smtClean="0"/>
-              <a:t>32</a:t>
-            </a:fld>
-            <a:endParaRPr lang="es-AR"/>
-          </a:p>
-        </p:txBody>
-      </p:sp>
-    </p:spTree>
-    <p:extLst>
-      <p:ext uri="{BB962C8B-B14F-4D97-AF65-F5344CB8AC3E}">
-        <p14:creationId xmlns:p14="http://schemas.microsoft.com/office/powerpoint/2010/main" val="24902220"/>
-      </p:ext>
-    </p:extLst>
-  </p:cSld>
-  <p:clrMapOvr>
-    <a:masterClrMapping/>
-  </p:clrMapOvr>
-</p:notes>
-</file>
-
-<file path=ppt/notesSlides/notesSlide12.xml><?xml version="1.0" encoding="utf-8"?>
-<p:notes xmlns:a="http://schemas.openxmlformats.org/drawingml/2006/main" xmlns:r="http://schemas.openxmlformats.org/officeDocument/2006/relationships" xmlns:p="http://schemas.openxmlformats.org/presentationml/2006/main">
-  <p:cSld>
-    <p:spTree>
-      <p:nvGrpSpPr>
-        <p:cNvPr id="1" name=""/>
-        <p:cNvGrpSpPr/>
-        <p:nvPr/>
-      </p:nvGrpSpPr>
-      <p:grpSpPr>
-        <a:xfrm>
-          <a:off x="0" y="0"/>
-          <a:ext cx="0" cy="0"/>
-          <a:chOff x="0" y="0"/>
-          <a:chExt cx="0" cy="0"/>
-        </a:xfrm>
-      </p:grpSpPr>
-      <p:sp>
-        <p:nvSpPr>
-          <p:cNvPr id="2" name="Slide Image Placeholder 1"/>
-          <p:cNvSpPr>
-            <a:spLocks noGrp="1" noRot="1" noChangeAspect="1"/>
-          </p:cNvSpPr>
-          <p:nvPr>
-            <p:ph type="sldImg"/>
-          </p:nvPr>
-        </p:nvSpPr>
-        <p:spPr/>
-      </p:sp>
-      <p:sp>
-        <p:nvSpPr>
-          <p:cNvPr id="3" name="Notes Placeholder 2"/>
-          <p:cNvSpPr>
-            <a:spLocks noGrp="1"/>
-          </p:cNvSpPr>
-          <p:nvPr>
-            <p:ph type="body" idx="1"/>
-          </p:nvPr>
-        </p:nvSpPr>
-        <p:spPr/>
-        <p:txBody>
-          <a:bodyPr/>
-          <a:lstStyle/>
-          <a:p>
-            <a:r>
-              <a:rPr lang="en-US" dirty="0" err="1" smtClean="0"/>
-              <a:t>Tambien</a:t>
-            </a:r>
-            <a:r>
-              <a:rPr lang="en-US" dirty="0" smtClean="0"/>
-              <a:t> </a:t>
-            </a:r>
-            <a:r>
-              <a:rPr lang="en-US" dirty="0" err="1" smtClean="0"/>
-              <a:t>podemos</a:t>
-            </a:r>
-            <a:r>
-              <a:rPr lang="en-US" dirty="0" smtClean="0"/>
-              <a:t> </a:t>
-            </a:r>
-            <a:r>
-              <a:rPr lang="en-US" dirty="0" err="1" smtClean="0"/>
-              <a:t>crear</a:t>
-            </a:r>
-            <a:r>
-              <a:rPr lang="en-US" dirty="0" smtClean="0"/>
-              <a:t> </a:t>
-            </a:r>
-            <a:r>
-              <a:rPr lang="en-US" dirty="0" err="1" smtClean="0"/>
-              <a:t>filtros</a:t>
-            </a:r>
-            <a:r>
-              <a:rPr lang="en-US" dirty="0" smtClean="0"/>
-              <a:t> custom para </a:t>
-            </a:r>
-            <a:r>
-              <a:rPr lang="en-US" dirty="0" err="1" smtClean="0"/>
-              <a:t>usar</a:t>
-            </a:r>
-            <a:r>
-              <a:rPr lang="en-US" dirty="0" smtClean="0"/>
-              <a:t> </a:t>
-            </a:r>
-            <a:r>
-              <a:rPr lang="en-US" dirty="0" err="1" smtClean="0"/>
-              <a:t>criterios</a:t>
-            </a:r>
-            <a:r>
-              <a:rPr lang="en-US" dirty="0" smtClean="0"/>
-              <a:t> mas </a:t>
-            </a:r>
-            <a:r>
-              <a:rPr lang="en-US" dirty="0" err="1" smtClean="0"/>
-              <a:t>complejos</a:t>
-            </a:r>
-            <a:r>
-              <a:rPr lang="en-US" dirty="0" smtClean="0"/>
-              <a:t> y </a:t>
-            </a:r>
-            <a:r>
-              <a:rPr lang="en-US" dirty="0" err="1" smtClean="0"/>
-              <a:t>reusables</a:t>
-            </a:r>
-            <a:r>
-              <a:rPr lang="en-US" dirty="0" smtClean="0"/>
-              <a:t>.</a:t>
-            </a:r>
-          </a:p>
-          <a:p>
-            <a:r>
-              <a:rPr lang="en-US" dirty="0" err="1" smtClean="0"/>
-              <a:t>Por</a:t>
-            </a:r>
-            <a:r>
-              <a:rPr lang="en-US" dirty="0" smtClean="0"/>
-              <a:t> </a:t>
-            </a:r>
-            <a:r>
-              <a:rPr lang="en-US" dirty="0" err="1" smtClean="0"/>
-              <a:t>ejemplo</a:t>
-            </a:r>
-            <a:r>
-              <a:rPr lang="en-US" dirty="0" smtClean="0"/>
-              <a:t>, </a:t>
-            </a:r>
-            <a:r>
-              <a:rPr lang="en-US" dirty="0" err="1" smtClean="0"/>
-              <a:t>si</a:t>
-            </a:r>
-            <a:r>
-              <a:rPr lang="en-US" dirty="0" smtClean="0"/>
-              <a:t> </a:t>
-            </a:r>
-            <a:r>
-              <a:rPr lang="en-US" dirty="0" err="1" smtClean="0"/>
-              <a:t>quisieramos</a:t>
-            </a:r>
-            <a:r>
-              <a:rPr lang="en-US" baseline="0" dirty="0" smtClean="0"/>
-              <a:t> </a:t>
-            </a:r>
-            <a:r>
-              <a:rPr lang="en-US" baseline="0" dirty="0" err="1" smtClean="0"/>
-              <a:t>filtrar</a:t>
-            </a:r>
-            <a:r>
-              <a:rPr lang="en-US" baseline="0" dirty="0" smtClean="0"/>
-              <a:t> los </a:t>
-            </a:r>
-            <a:r>
-              <a:rPr lang="en-US" baseline="0" dirty="0" err="1" smtClean="0"/>
-              <a:t>libros</a:t>
-            </a:r>
-            <a:r>
-              <a:rPr lang="en-US" baseline="0" dirty="0" smtClean="0"/>
-              <a:t> </a:t>
-            </a:r>
-            <a:r>
-              <a:rPr lang="en-US" baseline="0" dirty="0" err="1" smtClean="0"/>
-              <a:t>segun</a:t>
-            </a:r>
-            <a:r>
-              <a:rPr lang="en-US" baseline="0" dirty="0" smtClean="0"/>
-              <a:t> </a:t>
-            </a:r>
-            <a:r>
-              <a:rPr lang="en-US" baseline="0" dirty="0" err="1" smtClean="0"/>
-              <a:t>si</a:t>
-            </a:r>
-            <a:r>
-              <a:rPr lang="en-US" baseline="0" dirty="0" smtClean="0"/>
-              <a:t> se </a:t>
-            </a:r>
-            <a:r>
-              <a:rPr lang="en-US" baseline="0" dirty="0" err="1" smtClean="0"/>
-              <a:t>publicaron</a:t>
-            </a:r>
-            <a:r>
-              <a:rPr lang="en-US" baseline="0" dirty="0" smtClean="0"/>
-              <a:t> </a:t>
-            </a:r>
-            <a:r>
-              <a:rPr lang="en-US" baseline="0" dirty="0" err="1" smtClean="0"/>
-              <a:t>en</a:t>
-            </a:r>
-            <a:r>
-              <a:rPr lang="en-US" baseline="0" dirty="0" smtClean="0"/>
-              <a:t> un </a:t>
-            </a:r>
-            <a:r>
-              <a:rPr lang="en-US" baseline="0" dirty="0" err="1" smtClean="0"/>
-              <a:t>pais</a:t>
-            </a:r>
-            <a:r>
-              <a:rPr lang="en-US" baseline="0" dirty="0" smtClean="0"/>
-              <a:t>.</a:t>
-            </a:r>
-            <a:endParaRPr lang="es-AR" dirty="0" smtClean="0"/>
-          </a:p>
-          <a:p>
-            <a:endParaRPr lang="es-AR" dirty="0"/>
-          </a:p>
-        </p:txBody>
-      </p:sp>
-      <p:sp>
-        <p:nvSpPr>
-          <p:cNvPr id="4" name="Slide Number Placeholder 3"/>
-          <p:cNvSpPr>
-            <a:spLocks noGrp="1"/>
-          </p:cNvSpPr>
-          <p:nvPr>
-            <p:ph type="sldNum" sz="quarter" idx="10"/>
-          </p:nvPr>
-        </p:nvSpPr>
-        <p:spPr/>
-        <p:txBody>
-          <a:bodyPr/>
-          <a:lstStyle/>
-          <a:p>
-            <a:fld id="{7D61118C-0B68-45A8-8791-420E0DB4DDEA}" type="slidenum">
-              <a:rPr lang="es-AR" smtClean="0"/>
-              <a:t>34</a:t>
-            </a:fld>
-            <a:endParaRPr lang="es-AR"/>
-          </a:p>
-        </p:txBody>
-      </p:sp>
-    </p:spTree>
-    <p:extLst>
-      <p:ext uri="{BB962C8B-B14F-4D97-AF65-F5344CB8AC3E}">
-        <p14:creationId xmlns:p14="http://schemas.microsoft.com/office/powerpoint/2010/main" val="1671644604"/>
-      </p:ext>
-    </p:extLst>
-  </p:cSld>
-  <p:clrMapOvr>
-    <a:masterClrMapping/>
-  </p:clrMapOvr>
-</p:notes>
-</file>
-
-<file path=ppt/notesSlides/notesSlide13.xml><?xml version="1.0" encoding="utf-8"?>
-<p:notes xmlns:a="http://schemas.openxmlformats.org/drawingml/2006/main" xmlns:r="http://schemas.openxmlformats.org/officeDocument/2006/relationships" xmlns:p="http://schemas.openxmlformats.org/presentationml/2006/main">
-  <p:cSld>
-    <p:spTree>
-      <p:nvGrpSpPr>
-        <p:cNvPr id="1" name=""/>
-        <p:cNvGrpSpPr/>
-        <p:nvPr/>
-      </p:nvGrpSpPr>
-      <p:grpSpPr>
-        <a:xfrm>
-          <a:off x="0" y="0"/>
-          <a:ext cx="0" cy="0"/>
-          <a:chOff x="0" y="0"/>
-          <a:chExt cx="0" cy="0"/>
-        </a:xfrm>
-      </p:grpSpPr>
-      <p:sp>
-        <p:nvSpPr>
-          <p:cNvPr id="2" name="Slide Image Placeholder 1"/>
-          <p:cNvSpPr>
-            <a:spLocks noGrp="1" noRot="1" noChangeAspect="1"/>
-          </p:cNvSpPr>
-          <p:nvPr>
-            <p:ph type="sldImg"/>
-          </p:nvPr>
-        </p:nvSpPr>
-        <p:spPr/>
-      </p:sp>
-      <p:sp>
-        <p:nvSpPr>
-          <p:cNvPr id="3" name="Notes Placeholder 2"/>
-          <p:cNvSpPr>
-            <a:spLocks noGrp="1"/>
-          </p:cNvSpPr>
-          <p:nvPr>
-            <p:ph type="body" idx="1"/>
-          </p:nvPr>
-        </p:nvSpPr>
-        <p:spPr/>
-        <p:txBody>
-          <a:bodyPr/>
-          <a:lstStyle/>
-          <a:p>
-            <a:r>
-              <a:rPr lang="en-US" dirty="0" err="1" smtClean="0"/>
-              <a:t>Declaramos</a:t>
-            </a:r>
-            <a:r>
-              <a:rPr lang="en-US" dirty="0" smtClean="0"/>
-              <a:t> el filter se la </a:t>
-            </a:r>
-            <a:r>
-              <a:rPr lang="en-US" dirty="0" err="1" smtClean="0"/>
-              <a:t>siguiente</a:t>
-            </a:r>
-            <a:r>
-              <a:rPr lang="en-US" dirty="0" smtClean="0"/>
-              <a:t> </a:t>
-            </a:r>
-            <a:r>
-              <a:rPr lang="en-US" dirty="0" err="1" smtClean="0"/>
-              <a:t>manera</a:t>
-            </a:r>
-            <a:r>
-              <a:rPr lang="en-US" dirty="0" smtClean="0"/>
-              <a:t>:</a:t>
-            </a:r>
-          </a:p>
-          <a:p>
-            <a:r>
-              <a:rPr lang="en-US" dirty="0" err="1" smtClean="0"/>
-              <a:t>Usamos</a:t>
-            </a:r>
-            <a:r>
-              <a:rPr lang="en-US" dirty="0" smtClean="0"/>
-              <a:t> la function filter para </a:t>
-            </a:r>
-            <a:r>
-              <a:rPr lang="en-US" dirty="0" err="1" smtClean="0"/>
-              <a:t>crear</a:t>
-            </a:r>
-            <a:r>
-              <a:rPr lang="en-US" dirty="0" smtClean="0"/>
-              <a:t> </a:t>
-            </a:r>
-            <a:r>
-              <a:rPr lang="en-US" dirty="0" err="1" smtClean="0"/>
-              <a:t>uno</a:t>
-            </a:r>
-            <a:r>
-              <a:rPr lang="en-US" dirty="0" smtClean="0"/>
-              <a:t> Nuevo.</a:t>
-            </a:r>
-          </a:p>
-          <a:p>
-            <a:r>
-              <a:rPr lang="en-US" dirty="0" smtClean="0"/>
-              <a:t>El primer</a:t>
-            </a:r>
-            <a:r>
-              <a:rPr lang="en-US" baseline="0" dirty="0" smtClean="0"/>
-              <a:t> </a:t>
-            </a:r>
-            <a:r>
-              <a:rPr lang="en-US" baseline="0" dirty="0" err="1" smtClean="0"/>
-              <a:t>parametro</a:t>
-            </a:r>
-            <a:r>
-              <a:rPr lang="en-US" baseline="0" dirty="0" smtClean="0"/>
-              <a:t> </a:t>
-            </a:r>
-            <a:r>
-              <a:rPr lang="en-US" baseline="0" dirty="0" err="1" smtClean="0"/>
-              <a:t>es</a:t>
-            </a:r>
-            <a:r>
-              <a:rPr lang="en-US" baseline="0" dirty="0" smtClean="0"/>
-              <a:t> el </a:t>
-            </a:r>
-            <a:r>
-              <a:rPr lang="en-US" baseline="0" dirty="0" err="1" smtClean="0"/>
-              <a:t>nombre</a:t>
-            </a:r>
-            <a:r>
-              <a:rPr lang="en-US" baseline="0" dirty="0" smtClean="0"/>
-              <a:t> del filter (</a:t>
-            </a:r>
-            <a:r>
-              <a:rPr lang="en-US" baseline="0" dirty="0" err="1" smtClean="0"/>
-              <a:t>que</a:t>
-            </a:r>
-            <a:r>
-              <a:rPr lang="en-US" baseline="0" dirty="0" smtClean="0"/>
-              <a:t> </a:t>
-            </a:r>
-            <a:r>
-              <a:rPr lang="en-US" baseline="0" dirty="0" err="1" smtClean="0"/>
-              <a:t>vamos</a:t>
-            </a:r>
-            <a:r>
-              <a:rPr lang="en-US" baseline="0" dirty="0" smtClean="0"/>
-              <a:t> a </a:t>
-            </a:r>
-            <a:r>
-              <a:rPr lang="en-US" baseline="0" dirty="0" err="1" smtClean="0"/>
-              <a:t>usar</a:t>
-            </a:r>
-            <a:r>
-              <a:rPr lang="en-US" baseline="0" dirty="0" smtClean="0"/>
-              <a:t> </a:t>
-            </a:r>
-            <a:r>
-              <a:rPr lang="en-US" baseline="0" dirty="0" err="1" smtClean="0"/>
-              <a:t>en</a:t>
-            </a:r>
-            <a:r>
-              <a:rPr lang="en-US" baseline="0" dirty="0" smtClean="0"/>
-              <a:t> el HTML)</a:t>
-            </a:r>
-          </a:p>
-          <a:p>
-            <a:r>
-              <a:rPr lang="en-US" dirty="0" err="1" smtClean="0"/>
-              <a:t>Luego</a:t>
-            </a:r>
-            <a:r>
-              <a:rPr lang="en-US" dirty="0" smtClean="0"/>
-              <a:t> </a:t>
-            </a:r>
-            <a:r>
-              <a:rPr lang="en-US" dirty="0" err="1" smtClean="0"/>
-              <a:t>tenemos</a:t>
-            </a:r>
-            <a:r>
-              <a:rPr lang="en-US" dirty="0" smtClean="0"/>
-              <a:t> la function </a:t>
-            </a:r>
-            <a:r>
-              <a:rPr lang="en-US" dirty="0" err="1" smtClean="0"/>
-              <a:t>que</a:t>
-            </a:r>
-            <a:r>
-              <a:rPr lang="en-US" dirty="0" smtClean="0"/>
-              <a:t> </a:t>
-            </a:r>
-            <a:r>
-              <a:rPr lang="en-US" dirty="0" err="1" smtClean="0"/>
-              <a:t>filtra</a:t>
-            </a:r>
-            <a:r>
-              <a:rPr lang="en-US" dirty="0" smtClean="0"/>
-              <a:t> </a:t>
-            </a:r>
-            <a:r>
-              <a:rPr lang="en-US" dirty="0" err="1" smtClean="0"/>
-              <a:t>en</a:t>
-            </a:r>
-            <a:r>
-              <a:rPr lang="en-US" dirty="0" smtClean="0"/>
-              <a:t> </a:t>
-            </a:r>
-            <a:r>
-              <a:rPr lang="en-US" dirty="0" err="1" smtClean="0"/>
-              <a:t>si</a:t>
-            </a:r>
-            <a:r>
-              <a:rPr lang="en-US" dirty="0" smtClean="0"/>
-              <a:t>.</a:t>
-            </a:r>
-          </a:p>
-          <a:p>
-            <a:r>
-              <a:rPr lang="en-US" dirty="0" err="1" smtClean="0"/>
-              <a:t>Recibe</a:t>
-            </a:r>
-            <a:r>
-              <a:rPr lang="en-US" baseline="0" dirty="0" smtClean="0"/>
-              <a:t> </a:t>
-            </a:r>
-            <a:r>
-              <a:rPr lang="en-US" baseline="0" dirty="0" err="1" smtClean="0"/>
-              <a:t>como</a:t>
-            </a:r>
-            <a:r>
-              <a:rPr lang="en-US" baseline="0" dirty="0" smtClean="0"/>
-              <a:t> </a:t>
-            </a:r>
-            <a:r>
-              <a:rPr lang="en-US" baseline="0" dirty="0" err="1" smtClean="0"/>
-              <a:t>parametro</a:t>
-            </a:r>
-            <a:r>
-              <a:rPr lang="en-US" baseline="0" dirty="0" smtClean="0"/>
-              <a:t> los </a:t>
-            </a:r>
-            <a:r>
-              <a:rPr lang="en-US" baseline="0" dirty="0" err="1" smtClean="0"/>
-              <a:t>elementos</a:t>
-            </a:r>
-            <a:r>
-              <a:rPr lang="en-US" baseline="0" dirty="0" smtClean="0"/>
-              <a:t> </a:t>
-            </a:r>
-            <a:r>
-              <a:rPr lang="en-US" baseline="0" dirty="0" err="1" smtClean="0"/>
-              <a:t>sobre</a:t>
-            </a:r>
-            <a:r>
-              <a:rPr lang="en-US" baseline="0" dirty="0" smtClean="0"/>
-              <a:t> el </a:t>
-            </a:r>
-            <a:r>
-              <a:rPr lang="en-US" baseline="0" dirty="0" err="1" smtClean="0"/>
-              <a:t>cual</a:t>
-            </a:r>
-            <a:r>
-              <a:rPr lang="en-US" baseline="0" dirty="0" smtClean="0"/>
-              <a:t> se </a:t>
-            </a:r>
-            <a:r>
-              <a:rPr lang="en-US" baseline="0" dirty="0" err="1" smtClean="0"/>
-              <a:t>aplica</a:t>
-            </a:r>
-            <a:r>
-              <a:rPr lang="en-US" baseline="0" dirty="0" smtClean="0"/>
-              <a:t> el filter.</a:t>
-            </a:r>
-          </a:p>
-          <a:p>
-            <a:r>
-              <a:rPr lang="en-US" baseline="0" dirty="0" err="1" smtClean="0"/>
-              <a:t>Devuelve</a:t>
-            </a:r>
-            <a:r>
-              <a:rPr lang="en-US" baseline="0" dirty="0" smtClean="0"/>
-              <a:t> </a:t>
-            </a:r>
-            <a:r>
-              <a:rPr lang="en-US" baseline="0" dirty="0" err="1" smtClean="0"/>
-              <a:t>una</a:t>
-            </a:r>
-            <a:r>
-              <a:rPr lang="en-US" baseline="0" dirty="0" smtClean="0"/>
-              <a:t> </a:t>
-            </a:r>
-            <a:r>
-              <a:rPr lang="en-US" baseline="0" dirty="0" err="1" smtClean="0"/>
-              <a:t>nueva</a:t>
-            </a:r>
-            <a:r>
-              <a:rPr lang="en-US" baseline="0" dirty="0" smtClean="0"/>
-              <a:t> </a:t>
-            </a:r>
-            <a:r>
-              <a:rPr lang="en-US" baseline="0" dirty="0" err="1" smtClean="0"/>
-              <a:t>coleccion</a:t>
-            </a:r>
-            <a:r>
-              <a:rPr lang="en-US" baseline="0" dirty="0" smtClean="0"/>
-              <a:t> con los </a:t>
-            </a:r>
-            <a:r>
-              <a:rPr lang="en-US" baseline="0" dirty="0" err="1" smtClean="0"/>
-              <a:t>elementos</a:t>
-            </a:r>
-            <a:r>
-              <a:rPr lang="en-US" baseline="0" dirty="0" smtClean="0"/>
-              <a:t> </a:t>
-            </a:r>
-            <a:r>
-              <a:rPr lang="en-US" baseline="0" dirty="0" err="1" smtClean="0"/>
-              <a:t>filtrados</a:t>
-            </a:r>
-            <a:r>
-              <a:rPr lang="en-US" baseline="0" dirty="0" smtClean="0"/>
-              <a:t>.</a:t>
-            </a:r>
-          </a:p>
-          <a:p>
-            <a:endParaRPr lang="es-AR" dirty="0" smtClean="0"/>
-          </a:p>
-          <a:p>
-            <a:endParaRPr lang="es-AR" dirty="0"/>
-          </a:p>
-        </p:txBody>
-      </p:sp>
-      <p:sp>
-        <p:nvSpPr>
-          <p:cNvPr id="4" name="Slide Number Placeholder 3"/>
-          <p:cNvSpPr>
-            <a:spLocks noGrp="1"/>
-          </p:cNvSpPr>
-          <p:nvPr>
-            <p:ph type="sldNum" sz="quarter" idx="10"/>
-          </p:nvPr>
-        </p:nvSpPr>
-        <p:spPr/>
-        <p:txBody>
-          <a:bodyPr/>
-          <a:lstStyle/>
-          <a:p>
-            <a:fld id="{7D61118C-0B68-45A8-8791-420E0DB4DDEA}" type="slidenum">
-              <a:rPr lang="es-AR" smtClean="0"/>
-              <a:t>35</a:t>
-            </a:fld>
-            <a:endParaRPr lang="es-AR"/>
-          </a:p>
-        </p:txBody>
-      </p:sp>
-    </p:spTree>
-    <p:extLst>
-      <p:ext uri="{BB962C8B-B14F-4D97-AF65-F5344CB8AC3E}">
-        <p14:creationId xmlns:p14="http://schemas.microsoft.com/office/powerpoint/2010/main" val="1344189157"/>
-      </p:ext>
-    </p:extLst>
-  </p:cSld>
-  <p:clrMapOvr>
-    <a:masterClrMapping/>
-  </p:clrMapOvr>
-</p:notes>
-</file>
-
-<file path=ppt/notesSlides/notesSlide14.xml><?xml version="1.0" encoding="utf-8"?>
-<p:notes xmlns:a="http://schemas.openxmlformats.org/drawingml/2006/main" xmlns:r="http://schemas.openxmlformats.org/officeDocument/2006/relationships" xmlns:p="http://schemas.openxmlformats.org/presentationml/2006/main">
-  <p:cSld>
-    <p:spTree>
-      <p:nvGrpSpPr>
-        <p:cNvPr id="1" name=""/>
-        <p:cNvGrpSpPr/>
-        <p:nvPr/>
-      </p:nvGrpSpPr>
-      <p:grpSpPr>
-        <a:xfrm>
-          <a:off x="0" y="0"/>
-          <a:ext cx="0" cy="0"/>
-          <a:chOff x="0" y="0"/>
-          <a:chExt cx="0" cy="0"/>
-        </a:xfrm>
-      </p:grpSpPr>
-      <p:sp>
-        <p:nvSpPr>
-          <p:cNvPr id="2" name="Slide Image Placeholder 1"/>
-          <p:cNvSpPr>
-            <a:spLocks noGrp="1" noRot="1" noChangeAspect="1"/>
-          </p:cNvSpPr>
-          <p:nvPr>
-            <p:ph type="sldImg"/>
-          </p:nvPr>
-        </p:nvSpPr>
-        <p:spPr/>
-      </p:sp>
-      <p:sp>
-        <p:nvSpPr>
-          <p:cNvPr id="3" name="Notes Placeholder 2"/>
-          <p:cNvSpPr>
-            <a:spLocks noGrp="1"/>
-          </p:cNvSpPr>
-          <p:nvPr>
-            <p:ph type="body" idx="1"/>
-          </p:nvPr>
-        </p:nvSpPr>
-        <p:spPr/>
-        <p:txBody>
-          <a:bodyPr/>
-          <a:lstStyle/>
-          <a:p>
-            <a:r>
-              <a:rPr lang="en-US" dirty="0" err="1" smtClean="0"/>
-              <a:t>En</a:t>
-            </a:r>
-            <a:r>
-              <a:rPr lang="en-US" dirty="0" smtClean="0"/>
-              <a:t> </a:t>
-            </a:r>
-            <a:r>
-              <a:rPr lang="en-US" dirty="0" err="1" smtClean="0"/>
-              <a:t>este</a:t>
-            </a:r>
-            <a:r>
-              <a:rPr lang="en-US" dirty="0" smtClean="0"/>
-              <a:t> </a:t>
-            </a:r>
-            <a:r>
-              <a:rPr lang="en-US" dirty="0" err="1" smtClean="0"/>
-              <a:t>ejemplo</a:t>
-            </a:r>
-            <a:r>
-              <a:rPr lang="en-US" dirty="0" smtClean="0"/>
-              <a:t> </a:t>
-            </a:r>
-            <a:r>
-              <a:rPr lang="en-US" dirty="0" err="1" smtClean="0"/>
-              <a:t>obtenemos</a:t>
-            </a:r>
-            <a:r>
-              <a:rPr lang="en-US" baseline="0" dirty="0" smtClean="0"/>
-              <a:t> </a:t>
-            </a:r>
-            <a:r>
-              <a:rPr lang="en-US" baseline="0" dirty="0" err="1" smtClean="0"/>
-              <a:t>por</a:t>
-            </a:r>
-            <a:r>
-              <a:rPr lang="en-US" baseline="0" dirty="0" smtClean="0"/>
-              <a:t> </a:t>
-            </a:r>
-            <a:r>
-              <a:rPr lang="en-US" baseline="0" dirty="0" err="1" smtClean="0"/>
-              <a:t>parametro</a:t>
-            </a:r>
-            <a:r>
-              <a:rPr lang="en-US" baseline="0" dirty="0" smtClean="0"/>
-              <a:t> los </a:t>
-            </a:r>
-            <a:r>
-              <a:rPr lang="en-US" baseline="0" dirty="0" err="1" smtClean="0"/>
-              <a:t>libros</a:t>
-            </a:r>
-            <a:r>
-              <a:rPr lang="en-US" baseline="0" dirty="0" smtClean="0"/>
-              <a:t> y el </a:t>
-            </a:r>
-            <a:r>
-              <a:rPr lang="en-US" baseline="0" dirty="0" err="1" smtClean="0"/>
-              <a:t>pais</a:t>
-            </a:r>
-            <a:r>
-              <a:rPr lang="en-US" baseline="0" dirty="0" smtClean="0"/>
-              <a:t> </a:t>
-            </a:r>
-            <a:r>
-              <a:rPr lang="en-US" baseline="0" dirty="0" err="1" smtClean="0"/>
-              <a:t>que</a:t>
-            </a:r>
-            <a:r>
-              <a:rPr lang="en-US" baseline="0" dirty="0" smtClean="0"/>
-              <a:t> </a:t>
-            </a:r>
-            <a:r>
-              <a:rPr lang="en-US" baseline="0" dirty="0" err="1" smtClean="0"/>
-              <a:t>pasamos</a:t>
-            </a:r>
-            <a:r>
-              <a:rPr lang="en-US" baseline="0" dirty="0" smtClean="0"/>
-              <a:t> </a:t>
-            </a:r>
-            <a:r>
-              <a:rPr lang="en-US" baseline="0" dirty="0" err="1" smtClean="0"/>
-              <a:t>por</a:t>
-            </a:r>
-            <a:r>
-              <a:rPr lang="en-US" baseline="0" dirty="0" smtClean="0"/>
-              <a:t> </a:t>
-            </a:r>
-            <a:r>
-              <a:rPr lang="en-US" baseline="0" dirty="0" err="1" smtClean="0"/>
-              <a:t>parametro</a:t>
-            </a:r>
-            <a:r>
-              <a:rPr lang="en-US" baseline="0" dirty="0" smtClean="0"/>
-              <a:t> al filter.</a:t>
-            </a:r>
-          </a:p>
-          <a:p>
-            <a:r>
-              <a:rPr lang="en-US" baseline="0" dirty="0" err="1" smtClean="0"/>
-              <a:t>Segun</a:t>
-            </a:r>
-            <a:r>
-              <a:rPr lang="en-US" baseline="0" dirty="0" smtClean="0"/>
-              <a:t> la </a:t>
-            </a:r>
-            <a:r>
-              <a:rPr lang="en-US" baseline="0" dirty="0" err="1" smtClean="0"/>
-              <a:t>condicion</a:t>
-            </a:r>
-            <a:r>
-              <a:rPr lang="en-US" baseline="0" dirty="0" smtClean="0"/>
-              <a:t> de el </a:t>
-            </a:r>
-            <a:r>
-              <a:rPr lang="en-US" baseline="0" dirty="0" err="1" smtClean="0"/>
-              <a:t>pais</a:t>
-            </a:r>
-            <a:r>
-              <a:rPr lang="en-US" baseline="0" dirty="0" smtClean="0"/>
-              <a:t> </a:t>
-            </a:r>
-            <a:r>
-              <a:rPr lang="en-US" baseline="0" dirty="0" err="1" smtClean="0"/>
-              <a:t>agregamos</a:t>
-            </a:r>
-            <a:r>
-              <a:rPr lang="en-US" baseline="0" dirty="0" smtClean="0"/>
-              <a:t> o no el </a:t>
-            </a:r>
-            <a:r>
-              <a:rPr lang="en-US" baseline="0" dirty="0" err="1" smtClean="0"/>
-              <a:t>libro</a:t>
-            </a:r>
-            <a:r>
-              <a:rPr lang="en-US" baseline="0" dirty="0" smtClean="0"/>
-              <a:t> a la </a:t>
-            </a:r>
-            <a:r>
-              <a:rPr lang="en-US" baseline="0" dirty="0" err="1" smtClean="0"/>
-              <a:t>coleccion</a:t>
-            </a:r>
-            <a:r>
-              <a:rPr lang="en-US" baseline="0" dirty="0" smtClean="0"/>
-              <a:t> </a:t>
-            </a:r>
-            <a:r>
-              <a:rPr lang="en-US" baseline="0" dirty="0" err="1" smtClean="0"/>
-              <a:t>resultante</a:t>
-            </a:r>
-            <a:endParaRPr lang="es-AR" dirty="0" smtClean="0"/>
-          </a:p>
-          <a:p>
-            <a:endParaRPr lang="es-AR" dirty="0"/>
-          </a:p>
-        </p:txBody>
-      </p:sp>
-      <p:sp>
-        <p:nvSpPr>
-          <p:cNvPr id="4" name="Slide Number Placeholder 3"/>
-          <p:cNvSpPr>
-            <a:spLocks noGrp="1"/>
-          </p:cNvSpPr>
-          <p:nvPr>
-            <p:ph type="sldNum" sz="quarter" idx="10"/>
-          </p:nvPr>
-        </p:nvSpPr>
-        <p:spPr/>
-        <p:txBody>
-          <a:bodyPr/>
-          <a:lstStyle/>
-          <a:p>
-            <a:fld id="{7D61118C-0B68-45A8-8791-420E0DB4DDEA}" type="slidenum">
-              <a:rPr lang="es-AR" smtClean="0"/>
-              <a:t>36</a:t>
-            </a:fld>
-            <a:endParaRPr lang="es-AR"/>
-          </a:p>
-        </p:txBody>
-      </p:sp>
-    </p:spTree>
-    <p:extLst>
-      <p:ext uri="{BB962C8B-B14F-4D97-AF65-F5344CB8AC3E}">
-        <p14:creationId xmlns:p14="http://schemas.microsoft.com/office/powerpoint/2010/main" val="2333622337"/>
-      </p:ext>
-    </p:extLst>
-  </p:cSld>
-  <p:clrMapOvr>
-    <a:masterClrMapping/>
-  </p:clrMapOvr>
-</p:notes>
-</file>
-
-<file path=ppt/notesSlides/notesSlide15.xml><?xml version="1.0" encoding="utf-8"?>
-<p:notes xmlns:a="http://schemas.openxmlformats.org/drawingml/2006/main" xmlns:r="http://schemas.openxmlformats.org/officeDocument/2006/relationships" xmlns:p="http://schemas.openxmlformats.org/presentationml/2006/main">
-  <p:cSld>
-    <p:spTree>
-      <p:nvGrpSpPr>
-        <p:cNvPr id="1" name=""/>
-        <p:cNvGrpSpPr/>
-        <p:nvPr/>
-      </p:nvGrpSpPr>
-      <p:grpSpPr>
-        <a:xfrm>
-          <a:off x="0" y="0"/>
-          <a:ext cx="0" cy="0"/>
-          <a:chOff x="0" y="0"/>
-          <a:chExt cx="0" cy="0"/>
-        </a:xfrm>
-      </p:grpSpPr>
-      <p:sp>
-        <p:nvSpPr>
-          <p:cNvPr id="2" name="Slide Image Placeholder 1"/>
-          <p:cNvSpPr>
-            <a:spLocks noGrp="1" noRot="1" noChangeAspect="1"/>
-          </p:cNvSpPr>
-          <p:nvPr>
-            <p:ph type="sldImg"/>
-          </p:nvPr>
-        </p:nvSpPr>
-        <p:spPr/>
-      </p:sp>
-      <p:sp>
-        <p:nvSpPr>
-          <p:cNvPr id="3" name="Notes Placeholder 2"/>
-          <p:cNvSpPr>
-            <a:spLocks noGrp="1"/>
-          </p:cNvSpPr>
-          <p:nvPr>
-            <p:ph type="body" idx="1"/>
-          </p:nvPr>
-        </p:nvSpPr>
-        <p:spPr/>
-        <p:txBody>
-          <a:bodyPr/>
-          <a:lstStyle/>
-          <a:p>
-            <a:r>
-              <a:rPr lang="es-AR" sz="1200" dirty="0" smtClean="0"/>
-              <a:t>Punto 2: Baja el acoplamiento -&gt; simplifica el </a:t>
-            </a:r>
-            <a:r>
-              <a:rPr lang="es-AR" sz="1200" dirty="0" err="1" smtClean="0"/>
-              <a:t>testing</a:t>
-            </a:r>
-            <a:r>
-              <a:rPr lang="es-AR" sz="1200" dirty="0" smtClean="0"/>
-              <a:t>. Alta cohesión.</a:t>
-            </a:r>
-          </a:p>
-          <a:p>
-            <a:r>
-              <a:rPr lang="en-US" dirty="0" smtClean="0"/>
-              <a:t>Punto</a:t>
-            </a:r>
-            <a:r>
-              <a:rPr lang="en-US" baseline="0" dirty="0" smtClean="0"/>
-              <a:t> 3: O</a:t>
-            </a:r>
-            <a:r>
-              <a:rPr lang="es-AR" sz="1200" dirty="0" err="1" smtClean="0"/>
-              <a:t>yeron</a:t>
-            </a:r>
-            <a:r>
-              <a:rPr lang="es-AR" sz="1200" dirty="0" smtClean="0"/>
-              <a:t> hablar de </a:t>
-            </a:r>
-            <a:r>
-              <a:rPr lang="es-AR" sz="1200" dirty="0" err="1" smtClean="0"/>
-              <a:t>polymer</a:t>
-            </a:r>
-            <a:r>
-              <a:rPr lang="es-AR" sz="1200" dirty="0" smtClean="0"/>
-              <a:t>? Shadow DOM?</a:t>
-            </a:r>
-            <a:endParaRPr lang="es-AR" dirty="0" smtClean="0"/>
-          </a:p>
-          <a:p>
-            <a:endParaRPr lang="es-AR" dirty="0"/>
-          </a:p>
-        </p:txBody>
-      </p:sp>
-      <p:sp>
-        <p:nvSpPr>
-          <p:cNvPr id="4" name="Slide Number Placeholder 3"/>
-          <p:cNvSpPr>
-            <a:spLocks noGrp="1"/>
-          </p:cNvSpPr>
-          <p:nvPr>
-            <p:ph type="sldNum" sz="quarter" idx="10"/>
-          </p:nvPr>
-        </p:nvSpPr>
-        <p:spPr/>
-        <p:txBody>
-          <a:bodyPr/>
-          <a:lstStyle/>
-          <a:p>
-            <a:fld id="{7D61118C-0B68-45A8-8791-420E0DB4DDEA}" type="slidenum">
-              <a:rPr lang="es-AR" smtClean="0"/>
-              <a:t>38</a:t>
-            </a:fld>
-            <a:endParaRPr lang="es-AR"/>
-          </a:p>
-        </p:txBody>
-      </p:sp>
-    </p:spTree>
-    <p:extLst>
-      <p:ext uri="{BB962C8B-B14F-4D97-AF65-F5344CB8AC3E}">
-        <p14:creationId xmlns:p14="http://schemas.microsoft.com/office/powerpoint/2010/main" val="4035351363"/>
-      </p:ext>
-    </p:extLst>
-  </p:cSld>
-  <p:clrMapOvr>
-    <a:masterClrMapping/>
-  </p:clrMapOvr>
-</p:notes>
-</file>
-
-<file path=ppt/notesSlides/notesSlide16.xml><?xml version="1.0" encoding="utf-8"?>
-<p:notes xmlns:a="http://schemas.openxmlformats.org/drawingml/2006/main" xmlns:r="http://schemas.openxmlformats.org/officeDocument/2006/relationships" xmlns:p="http://schemas.openxmlformats.org/presentationml/2006/main">
-  <p:cSld>
-    <p:spTree>
-      <p:nvGrpSpPr>
-        <p:cNvPr id="1" name=""/>
-        <p:cNvGrpSpPr/>
-        <p:nvPr/>
-      </p:nvGrpSpPr>
-      <p:grpSpPr>
-        <a:xfrm>
-          <a:off x="0" y="0"/>
-          <a:ext cx="0" cy="0"/>
-          <a:chOff x="0" y="0"/>
-          <a:chExt cx="0" cy="0"/>
-        </a:xfrm>
-      </p:grpSpPr>
-      <p:sp>
-        <p:nvSpPr>
-          <p:cNvPr id="2" name="Slide Image Placeholder 1"/>
-          <p:cNvSpPr>
-            <a:spLocks noGrp="1" noRot="1" noChangeAspect="1"/>
-          </p:cNvSpPr>
-          <p:nvPr>
-            <p:ph type="sldImg"/>
-          </p:nvPr>
-        </p:nvSpPr>
-        <p:spPr/>
-      </p:sp>
-      <p:sp>
-        <p:nvSpPr>
-          <p:cNvPr id="3" name="Notes Placeholder 2"/>
-          <p:cNvSpPr>
-            <a:spLocks noGrp="1"/>
-          </p:cNvSpPr>
-          <p:nvPr>
-            <p:ph type="body" idx="1"/>
-          </p:nvPr>
-        </p:nvSpPr>
-        <p:spPr/>
-        <p:txBody>
-          <a:bodyPr/>
-          <a:lstStyle/>
-          <a:p>
-            <a:pPr marL="0" marR="0" indent="0" algn="l" defTabSz="914400" rtl="0" eaLnBrk="1" fontAlgn="auto" latinLnBrk="0" hangingPunct="1">
-              <a:lnSpc>
-                <a:spcPct val="100000"/>
-              </a:lnSpc>
-              <a:spcBef>
-                <a:spcPts val="0"/>
-              </a:spcBef>
-              <a:spcAft>
-                <a:spcPts val="0"/>
-              </a:spcAft>
-              <a:buClrTx/>
-              <a:buSzTx/>
-              <a:buFontTx/>
-              <a:buNone/>
-              <a:tabLst/>
-              <a:defRPr/>
-            </a:pPr>
-            <a:r>
-              <a:rPr lang="en-US" dirty="0" err="1" smtClean="0"/>
-              <a:t>Imagen</a:t>
-            </a:r>
-            <a:r>
-              <a:rPr lang="en-US" dirty="0" smtClean="0"/>
-              <a:t> </a:t>
-            </a:r>
-            <a:r>
-              <a:rPr lang="en-US" dirty="0" err="1" smtClean="0"/>
-              <a:t>intimidante</a:t>
-            </a:r>
-            <a:r>
-              <a:rPr lang="en-US" dirty="0" smtClean="0"/>
-              <a:t>.</a:t>
-            </a:r>
-            <a:r>
-              <a:rPr lang="en-US" baseline="0" dirty="0" smtClean="0"/>
-              <a:t> </a:t>
-            </a:r>
-            <a:r>
-              <a:rPr lang="en-US" dirty="0" err="1" smtClean="0"/>
-              <a:t>Parece</a:t>
-            </a:r>
-            <a:r>
-              <a:rPr lang="en-US" dirty="0" smtClean="0"/>
-              <a:t> </a:t>
-            </a:r>
-            <a:r>
-              <a:rPr lang="en-US" dirty="0" err="1" smtClean="0"/>
-              <a:t>bastante</a:t>
-            </a:r>
-            <a:r>
-              <a:rPr lang="en-US" dirty="0" smtClean="0"/>
-              <a:t> </a:t>
-            </a:r>
-            <a:r>
-              <a:rPr lang="en-US" dirty="0" err="1" smtClean="0"/>
-              <a:t>dificil</a:t>
-            </a:r>
-            <a:r>
-              <a:rPr lang="en-US" dirty="0" smtClean="0"/>
-              <a:t>, </a:t>
-            </a:r>
-            <a:r>
-              <a:rPr lang="en-US" dirty="0" err="1" smtClean="0"/>
-              <a:t>pero</a:t>
-            </a:r>
-            <a:r>
-              <a:rPr lang="en-US" dirty="0" smtClean="0"/>
-              <a:t> no lo </a:t>
-            </a:r>
-            <a:r>
-              <a:rPr lang="en-US" dirty="0" err="1" smtClean="0"/>
-              <a:t>es</a:t>
-            </a:r>
-            <a:r>
-              <a:rPr lang="en-US" baseline="0" dirty="0" smtClean="0"/>
-              <a:t> </a:t>
-            </a:r>
-            <a:r>
-              <a:rPr lang="en-US" baseline="0" dirty="0" err="1" smtClean="0"/>
-              <a:t>tanto</a:t>
-            </a:r>
-            <a:r>
-              <a:rPr lang="en-US" baseline="0" dirty="0" smtClean="0"/>
-              <a:t>.</a:t>
-            </a:r>
-            <a:endParaRPr lang="es-AR" dirty="0" smtClean="0"/>
-          </a:p>
-          <a:p>
-            <a:endParaRPr lang="es-AR" dirty="0"/>
-          </a:p>
-        </p:txBody>
-      </p:sp>
-      <p:sp>
-        <p:nvSpPr>
-          <p:cNvPr id="4" name="Slide Number Placeholder 3"/>
-          <p:cNvSpPr>
-            <a:spLocks noGrp="1"/>
-          </p:cNvSpPr>
-          <p:nvPr>
-            <p:ph type="sldNum" sz="quarter" idx="10"/>
-          </p:nvPr>
-        </p:nvSpPr>
-        <p:spPr/>
-        <p:txBody>
-          <a:bodyPr/>
-          <a:lstStyle/>
-          <a:p>
-            <a:fld id="{7D61118C-0B68-45A8-8791-420E0DB4DDEA}" type="slidenum">
-              <a:rPr lang="es-AR" smtClean="0"/>
-              <a:t>39</a:t>
-            </a:fld>
-            <a:endParaRPr lang="es-AR"/>
-          </a:p>
-        </p:txBody>
-      </p:sp>
-    </p:spTree>
-    <p:extLst>
-      <p:ext uri="{BB962C8B-B14F-4D97-AF65-F5344CB8AC3E}">
-        <p14:creationId xmlns:p14="http://schemas.microsoft.com/office/powerpoint/2010/main" val="2405341085"/>
-      </p:ext>
-    </p:extLst>
-  </p:cSld>
-  <p:clrMapOvr>
-    <a:masterClrMapping/>
-  </p:clrMapOvr>
-</p:notes>
-</file>
-
-<file path=ppt/notesSlides/notesSlide17.xml><?xml version="1.0" encoding="utf-8"?>
-<p:notes xmlns:a="http://schemas.openxmlformats.org/drawingml/2006/main" xmlns:r="http://schemas.openxmlformats.org/officeDocument/2006/relationships" xmlns:p="http://schemas.openxmlformats.org/presentationml/2006/main">
-  <p:cSld>
-    <p:spTree>
-      <p:nvGrpSpPr>
-        <p:cNvPr id="1" name=""/>
-        <p:cNvGrpSpPr/>
-        <p:nvPr/>
-      </p:nvGrpSpPr>
-      <p:grpSpPr>
-        <a:xfrm>
-          <a:off x="0" y="0"/>
-          <a:ext cx="0" cy="0"/>
-          <a:chOff x="0" y="0"/>
-          <a:chExt cx="0" cy="0"/>
-        </a:xfrm>
-      </p:grpSpPr>
-      <p:sp>
-        <p:nvSpPr>
-          <p:cNvPr id="2" name="Slide Image Placeholder 1"/>
-          <p:cNvSpPr>
-            <a:spLocks noGrp="1" noRot="1" noChangeAspect="1"/>
-          </p:cNvSpPr>
-          <p:nvPr>
-            <p:ph type="sldImg"/>
-          </p:nvPr>
-        </p:nvSpPr>
-        <p:spPr/>
-      </p:sp>
-      <p:sp>
-        <p:nvSpPr>
-          <p:cNvPr id="3" name="Notes Placeholder 2"/>
-          <p:cNvSpPr>
-            <a:spLocks noGrp="1"/>
-          </p:cNvSpPr>
-          <p:nvPr>
-            <p:ph type="body" idx="1"/>
-          </p:nvPr>
-        </p:nvSpPr>
-        <p:spPr/>
-        <p:txBody>
-          <a:bodyPr/>
-          <a:lstStyle/>
-          <a:p>
-            <a:r>
-              <a:rPr lang="es-AR" dirty="0" smtClean="0"/>
-              <a:t>En</a:t>
-            </a:r>
-            <a:r>
-              <a:rPr lang="es-AR" baseline="0" dirty="0" smtClean="0"/>
-              <a:t> </a:t>
-            </a:r>
-            <a:r>
-              <a:rPr lang="es-AR" baseline="0" dirty="0" err="1" smtClean="0"/>
-              <a:t>template</a:t>
-            </a:r>
-            <a:r>
-              <a:rPr lang="es-AR" baseline="0" dirty="0" smtClean="0"/>
-              <a:t> ponemos el HTML que va a generar la directiva cuando sea compilada, mientras que </a:t>
-            </a:r>
-            <a:r>
-              <a:rPr lang="es-AR" baseline="0" dirty="0" err="1" smtClean="0"/>
-              <a:t>templateUrl</a:t>
-            </a:r>
-            <a:r>
-              <a:rPr lang="es-AR" baseline="0" dirty="0" smtClean="0"/>
-              <a:t> toma la ruta en donde se encuentra definido el HTML. Es destacable el hecho de que en este </a:t>
-            </a:r>
-            <a:r>
-              <a:rPr lang="es-AR" baseline="0" dirty="0" err="1" smtClean="0"/>
-              <a:t>template</a:t>
-            </a:r>
-            <a:r>
-              <a:rPr lang="es-AR" baseline="0" dirty="0" smtClean="0"/>
-              <a:t> se pueda utilizar directivas ya definidas. El $</a:t>
-            </a:r>
-            <a:r>
-              <a:rPr lang="es-AR" baseline="0" dirty="0" err="1" smtClean="0"/>
-              <a:t>compiler</a:t>
-            </a:r>
-            <a:r>
-              <a:rPr lang="es-AR" baseline="0" dirty="0" smtClean="0"/>
-              <a:t> de </a:t>
-            </a:r>
-            <a:r>
-              <a:rPr lang="es-AR" baseline="0" dirty="0" err="1" smtClean="0"/>
-              <a:t>angularjs</a:t>
-            </a:r>
-            <a:r>
-              <a:rPr lang="es-AR" baseline="0" dirty="0" smtClean="0"/>
-              <a:t> lo compilará tomando el </a:t>
-            </a:r>
-            <a:r>
-              <a:rPr lang="es-AR" baseline="0" dirty="0" err="1" smtClean="0"/>
-              <a:t>scope</a:t>
-            </a:r>
-            <a:r>
-              <a:rPr lang="es-AR" baseline="0" dirty="0" smtClean="0"/>
-              <a:t> que tiene definida la directiva.</a:t>
-            </a:r>
-          </a:p>
-          <a:p>
-            <a:endParaRPr lang="es-AR" baseline="0" dirty="0" smtClean="0"/>
-          </a:p>
-          <a:p>
-            <a:r>
-              <a:rPr lang="es-AR" baseline="0" dirty="0" err="1" smtClean="0"/>
-              <a:t>Replace</a:t>
-            </a:r>
-            <a:r>
-              <a:rPr lang="es-AR" baseline="0" dirty="0" smtClean="0"/>
-              <a:t> indica si se va a reemplazar el HTML de la directiva o si se va a insertar como contenido.</a:t>
-            </a:r>
-          </a:p>
-          <a:p>
-            <a:endParaRPr lang="es-AR" baseline="0" dirty="0" smtClean="0"/>
-          </a:p>
-          <a:p>
-            <a:r>
-              <a:rPr lang="es-AR" baseline="0" dirty="0" err="1" smtClean="0"/>
-              <a:t>Restrict</a:t>
-            </a:r>
-            <a:r>
-              <a:rPr lang="es-AR" baseline="0" dirty="0" smtClean="0"/>
-              <a:t> indica si la directiva es un elemento, un atributo, una clase o un comentario. Por favor nada de usar comentarios y respecto a las clases habría que ver el caso particular.</a:t>
-            </a:r>
-          </a:p>
-          <a:p>
-            <a:endParaRPr lang="es-AR" baseline="0" dirty="0" smtClean="0"/>
-          </a:p>
-          <a:p>
-            <a:r>
-              <a:rPr lang="es-MX" baseline="0" dirty="0" err="1" smtClean="0"/>
-              <a:t>Scope</a:t>
-            </a:r>
-            <a:r>
-              <a:rPr lang="es-MX" baseline="0" dirty="0" smtClean="0"/>
-              <a:t> es el pegamento con el que unimos el </a:t>
-            </a:r>
-            <a:r>
-              <a:rPr lang="es-MX" baseline="0" dirty="0" err="1" smtClean="0"/>
-              <a:t>controller</a:t>
-            </a:r>
-            <a:r>
-              <a:rPr lang="es-MX" baseline="0" dirty="0" smtClean="0"/>
-              <a:t> padre, la directiva y el </a:t>
-            </a:r>
-            <a:r>
-              <a:rPr lang="es-MX" baseline="0" dirty="0" err="1" smtClean="0"/>
-              <a:t>template</a:t>
-            </a:r>
-            <a:r>
-              <a:rPr lang="es-MX" baseline="0" dirty="0" smtClean="0"/>
-              <a:t> de la directiva (canal de comunicación), existen 3 tipos:</a:t>
-            </a:r>
-          </a:p>
-          <a:p>
-            <a:r>
-              <a:rPr lang="es-MX" baseline="0" dirty="0" smtClean="0"/>
-              <a:t>  False: Opción por default no crea ningún </a:t>
-            </a:r>
-            <a:r>
-              <a:rPr lang="es-MX" baseline="0" dirty="0" err="1" smtClean="0"/>
-              <a:t>scope</a:t>
-            </a:r>
-            <a:r>
-              <a:rPr lang="es-MX" baseline="0" dirty="0" smtClean="0"/>
-              <a:t>, toma el </a:t>
-            </a:r>
-            <a:r>
-              <a:rPr lang="es-MX" baseline="0" dirty="0" err="1" smtClean="0"/>
-              <a:t>scope</a:t>
-            </a:r>
-            <a:r>
-              <a:rPr lang="es-MX" baseline="0" dirty="0" smtClean="0"/>
-              <a:t> padre (el que está definido para esa porción de HTML).</a:t>
-            </a:r>
-          </a:p>
-          <a:p>
-            <a:r>
-              <a:rPr lang="es-MX" baseline="0" dirty="0" smtClean="0"/>
-              <a:t>  Casos de uso: Si la directiva no accede/</a:t>
-            </a:r>
-            <a:r>
-              <a:rPr lang="es-MX" baseline="0" dirty="0" err="1" smtClean="0"/>
-              <a:t>setea</a:t>
-            </a:r>
-            <a:r>
-              <a:rPr lang="es-MX" baseline="0" dirty="0" smtClean="0"/>
-              <a:t> ninguna variable del </a:t>
-            </a:r>
-            <a:r>
-              <a:rPr lang="es-MX" baseline="0" dirty="0" err="1" smtClean="0"/>
-              <a:t>scope</a:t>
-            </a:r>
-            <a:r>
-              <a:rPr lang="es-MX" baseline="0" dirty="0" smtClean="0"/>
-              <a:t> o bien sea una directiva hija que es usada en el contexto de una directiva padre. Probablemente esté haciendo algo que no tenga que ver con </a:t>
-            </a:r>
-            <a:r>
-              <a:rPr lang="es-MX" baseline="0" dirty="0" err="1" smtClean="0"/>
-              <a:t>scope</a:t>
-            </a:r>
-            <a:r>
-              <a:rPr lang="es-MX" baseline="0" dirty="0" smtClean="0"/>
-              <a:t>, utilizando </a:t>
-            </a:r>
-            <a:r>
-              <a:rPr lang="es-MX" baseline="0" dirty="0" err="1" smtClean="0"/>
-              <a:t>algun</a:t>
-            </a:r>
-            <a:r>
-              <a:rPr lang="es-MX" baseline="0" dirty="0" smtClean="0"/>
-              <a:t> </a:t>
-            </a:r>
-            <a:r>
-              <a:rPr lang="es-MX" baseline="0" dirty="0" err="1" smtClean="0"/>
-              <a:t>plugin</a:t>
-            </a:r>
-            <a:r>
-              <a:rPr lang="es-MX" baseline="0" dirty="0" smtClean="0"/>
-              <a:t> de </a:t>
-            </a:r>
-            <a:r>
-              <a:rPr lang="es-MX" baseline="0" dirty="0" err="1" smtClean="0"/>
-              <a:t>jquery</a:t>
-            </a:r>
-            <a:r>
-              <a:rPr lang="es-MX" baseline="0" dirty="0" smtClean="0"/>
-              <a:t> por ejemplo.</a:t>
-            </a:r>
-          </a:p>
-          <a:p>
-            <a:endParaRPr lang="es-MX" baseline="0" dirty="0" smtClean="0"/>
-          </a:p>
-          <a:p>
-            <a:r>
-              <a:rPr lang="es-MX" baseline="0" dirty="0" smtClean="0"/>
-              <a:t>  True:  Crea un nuevo </a:t>
-            </a:r>
-            <a:r>
-              <a:rPr lang="es-MX" baseline="0" dirty="0" err="1" smtClean="0"/>
-              <a:t>scope</a:t>
-            </a:r>
-            <a:r>
-              <a:rPr lang="es-MX" baseline="0" dirty="0" smtClean="0"/>
-              <a:t> que hereda del padre de forma </a:t>
-            </a:r>
-            <a:r>
-              <a:rPr lang="es-MX" baseline="0" dirty="0" err="1" smtClean="0"/>
-              <a:t>prototipada</a:t>
-            </a:r>
-            <a:r>
-              <a:rPr lang="es-MX" baseline="0" dirty="0" smtClean="0"/>
-              <a:t> en donde pueda crear variables y métodos que no son relevantes fuera de la directiva (</a:t>
-            </a:r>
-            <a:r>
-              <a:rPr lang="es-MX" baseline="0" dirty="0" err="1" smtClean="0"/>
-              <a:t>scope</a:t>
-            </a:r>
-            <a:r>
-              <a:rPr lang="es-MX" baseline="0" dirty="0" smtClean="0"/>
-              <a:t> hermanos y padres), si directivas hijas con </a:t>
-            </a:r>
-            <a:r>
-              <a:rPr lang="es-MX" baseline="0" dirty="0" err="1" smtClean="0"/>
-              <a:t>scope:true</a:t>
-            </a:r>
-            <a:r>
-              <a:rPr lang="es-MX" baseline="0" dirty="0" smtClean="0"/>
-              <a:t>. (Esto es para una clase aparte, no lo vamos a usar por el momento.)</a:t>
-            </a:r>
-          </a:p>
-          <a:p>
-            <a:endParaRPr lang="es-MX" baseline="0" dirty="0" smtClean="0"/>
-          </a:p>
-          <a:p>
-            <a:r>
-              <a:rPr lang="es-MX" baseline="0" dirty="0" smtClean="0"/>
-              <a:t>  </a:t>
-            </a:r>
-            <a:r>
-              <a:rPr lang="es-MX" baseline="0" dirty="0" err="1" smtClean="0"/>
-              <a:t>Isolate</a:t>
-            </a:r>
-            <a:r>
-              <a:rPr lang="es-MX" baseline="0" dirty="0" smtClean="0"/>
-              <a:t>: Crea un nuevo </a:t>
-            </a:r>
-            <a:r>
-              <a:rPr lang="es-MX" baseline="0" dirty="0" err="1" smtClean="0"/>
-              <a:t>scope</a:t>
-            </a:r>
-            <a:r>
-              <a:rPr lang="es-MX" baseline="0" dirty="0" smtClean="0"/>
-              <a:t> que no hereda del padre de forma </a:t>
-            </a:r>
-            <a:r>
-              <a:rPr lang="es-MX" baseline="0" dirty="0" err="1" smtClean="0"/>
-              <a:t>prototipada</a:t>
-            </a:r>
-            <a:r>
-              <a:rPr lang="es-MX" baseline="0" dirty="0" smtClean="0"/>
-              <a:t> pero que puede acceder a las propiedades de este mediante la propiedad $</a:t>
-            </a:r>
-            <a:r>
-              <a:rPr lang="es-MX" baseline="0" dirty="0" err="1" smtClean="0"/>
-              <a:t>parent</a:t>
-            </a:r>
-            <a:r>
-              <a:rPr lang="es-MX" baseline="0" dirty="0" smtClean="0"/>
-              <a:t>. Esta es para componentes reusables. Puedo crear todas las variables y métodos que quiera y solo existirán para esta directiva.</a:t>
-            </a:r>
-          </a:p>
-          <a:p>
-            <a:r>
-              <a:rPr lang="es-MX" baseline="0" dirty="0" smtClean="0"/>
-              <a:t>La directiva tiene identidad propia. Yo decido que información del </a:t>
-            </a:r>
-            <a:r>
-              <a:rPr lang="es-MX" baseline="0" dirty="0" err="1" smtClean="0"/>
-              <a:t>scope</a:t>
-            </a:r>
-            <a:r>
-              <a:rPr lang="es-MX" baseline="0" dirty="0" smtClean="0"/>
-              <a:t> tendré en el mío.</a:t>
-            </a:r>
-          </a:p>
-          <a:p>
-            <a:r>
-              <a:rPr lang="es-MX" baseline="0" dirty="0" smtClean="0"/>
-              <a:t>La forma de usarlo es definiendo un {} objeto como </a:t>
-            </a:r>
-            <a:r>
-              <a:rPr lang="es-MX" baseline="0" dirty="0" err="1" smtClean="0"/>
-              <a:t>scope</a:t>
-            </a:r>
-            <a:r>
-              <a:rPr lang="es-MX" baseline="0" dirty="0" smtClean="0"/>
-              <a:t> y en este definir las propiedades que quiero del padre en mi </a:t>
-            </a:r>
-            <a:r>
-              <a:rPr lang="es-MX" baseline="0" dirty="0" err="1" smtClean="0"/>
-              <a:t>scope</a:t>
-            </a:r>
-            <a:r>
-              <a:rPr lang="es-MX" baseline="0" dirty="0" smtClean="0"/>
-              <a:t> local.</a:t>
-            </a:r>
-          </a:p>
-          <a:p>
-            <a:r>
-              <a:rPr lang="es-MX" baseline="0" dirty="0" smtClean="0"/>
-              <a:t>Existen 3 formas de acceder, nosotros veremos la que hace una unión bidireccional que es utilizando el signo =.</a:t>
-            </a:r>
-          </a:p>
-          <a:p>
-            <a:endParaRPr lang="es-AR" baseline="0" dirty="0" smtClean="0"/>
-          </a:p>
-          <a:p>
-            <a:r>
-              <a:rPr lang="es-AR" baseline="0" dirty="0" smtClean="0"/>
-              <a:t>Link: Puedo registrar </a:t>
-            </a:r>
-            <a:r>
-              <a:rPr lang="es-AR" baseline="0" dirty="0" err="1" smtClean="0"/>
-              <a:t>event</a:t>
-            </a:r>
-            <a:r>
-              <a:rPr lang="es-AR" baseline="0" dirty="0" smtClean="0"/>
-              <a:t> </a:t>
-            </a:r>
-            <a:r>
-              <a:rPr lang="es-AR" baseline="0" dirty="0" err="1" smtClean="0"/>
-              <a:t>listeners</a:t>
-            </a:r>
-            <a:r>
-              <a:rPr lang="es-AR" baseline="0" dirty="0" smtClean="0"/>
-              <a:t>. Observar cambios en el elemento de la directiva o registrar </a:t>
-            </a:r>
-            <a:r>
-              <a:rPr lang="es-AR" baseline="0" dirty="0" err="1" smtClean="0"/>
-              <a:t>watches</a:t>
-            </a:r>
-            <a:r>
-              <a:rPr lang="es-AR" baseline="0" dirty="0" smtClean="0"/>
-              <a:t> de las propiedades del </a:t>
-            </a:r>
-            <a:r>
-              <a:rPr lang="es-AR" baseline="0" dirty="0" err="1" smtClean="0"/>
-              <a:t>scope</a:t>
-            </a:r>
-            <a:r>
-              <a:rPr lang="es-AR" baseline="0" dirty="0" smtClean="0"/>
-              <a:t>.</a:t>
-            </a:r>
-          </a:p>
-          <a:p>
-            <a:endParaRPr lang="es-AR" baseline="0" dirty="0" smtClean="0"/>
-          </a:p>
-          <a:p>
-            <a:endParaRPr lang="es-AR" dirty="0"/>
-          </a:p>
-        </p:txBody>
-      </p:sp>
-      <p:sp>
-        <p:nvSpPr>
-          <p:cNvPr id="4" name="Slide Number Placeholder 3"/>
-          <p:cNvSpPr>
-            <a:spLocks noGrp="1"/>
-          </p:cNvSpPr>
-          <p:nvPr>
-            <p:ph type="sldNum" sz="quarter" idx="10"/>
-          </p:nvPr>
-        </p:nvSpPr>
-        <p:spPr/>
-        <p:txBody>
-          <a:bodyPr/>
-          <a:lstStyle/>
-          <a:p>
-            <a:fld id="{7D61118C-0B68-45A8-8791-420E0DB4DDEA}" type="slidenum">
-              <a:rPr lang="es-AR" smtClean="0"/>
-              <a:t>40</a:t>
-            </a:fld>
-            <a:endParaRPr lang="es-AR"/>
-          </a:p>
-        </p:txBody>
-      </p:sp>
-    </p:spTree>
-    <p:extLst>
-      <p:ext uri="{BB962C8B-B14F-4D97-AF65-F5344CB8AC3E}">
-        <p14:creationId xmlns:p14="http://schemas.microsoft.com/office/powerpoint/2010/main" val="1654710355"/>
-      </p:ext>
-    </p:extLst>
-  </p:cSld>
-  <p:clrMapOvr>
-    <a:masterClrMapping/>
-  </p:clrMapOvr>
-</p:notes>
-</file>
-
 <file path=ppt/notesSlides/notesSlide2.xml><?xml version="1.0" encoding="utf-8"?>
 <p:notes xmlns:a="http://schemas.openxmlformats.org/drawingml/2006/main" xmlns:r="http://schemas.openxmlformats.org/officeDocument/2006/relationships" xmlns:p="http://schemas.openxmlformats.org/presentationml/2006/main">
   <p:cSld>
@@ -2757,135 +755,7 @@
           <a:bodyPr/>
           <a:lstStyle/>
           <a:p>
-            <a:pPr marL="0" marR="0" indent="0" algn="l" defTabSz="914400" rtl="0" eaLnBrk="1" fontAlgn="auto" latinLnBrk="0" hangingPunct="1">
-              <a:lnSpc>
-                <a:spcPct val="100000"/>
-              </a:lnSpc>
-              <a:spcBef>
-                <a:spcPts val="0"/>
-              </a:spcBef>
-              <a:spcAft>
-                <a:spcPts val="0"/>
-              </a:spcAft>
-              <a:buClrTx/>
-              <a:buSzTx/>
-              <a:buFontTx/>
-              <a:buNone/>
-              <a:tabLst/>
-              <a:defRPr/>
-            </a:pPr>
-            <a:r>
-              <a:rPr lang="en-US" dirty="0" smtClean="0"/>
-              <a:t>El </a:t>
-            </a:r>
-            <a:r>
-              <a:rPr lang="en-US" dirty="0" err="1" smtClean="0"/>
-              <a:t>caso</a:t>
-            </a:r>
-            <a:r>
-              <a:rPr lang="en-US" dirty="0" smtClean="0"/>
-              <a:t> mas </a:t>
-            </a:r>
-            <a:r>
-              <a:rPr lang="en-US" dirty="0" err="1" smtClean="0"/>
-              <a:t>usado</a:t>
-            </a:r>
-            <a:r>
-              <a:rPr lang="en-US" baseline="0" dirty="0" smtClean="0"/>
-              <a:t> </a:t>
-            </a:r>
-            <a:r>
-              <a:rPr lang="en-US" baseline="0" dirty="0" err="1" smtClean="0"/>
-              <a:t>es</a:t>
-            </a:r>
-            <a:r>
-              <a:rPr lang="en-US" baseline="0" dirty="0" smtClean="0"/>
-              <a:t> el filter </a:t>
-            </a:r>
-            <a:r>
-              <a:rPr lang="en-US" baseline="0" dirty="0" err="1" smtClean="0"/>
-              <a:t>llamado</a:t>
-            </a:r>
-            <a:r>
-              <a:rPr lang="en-US" baseline="0" dirty="0" smtClean="0"/>
-              <a:t> “filter”. Lo </a:t>
-            </a:r>
-            <a:r>
-              <a:rPr lang="en-US" baseline="0" dirty="0" err="1" smtClean="0"/>
-              <a:t>que</a:t>
-            </a:r>
-            <a:r>
-              <a:rPr lang="en-US" baseline="0" dirty="0" smtClean="0"/>
-              <a:t> </a:t>
-            </a:r>
-            <a:r>
-              <a:rPr lang="en-US" baseline="0" dirty="0" err="1" smtClean="0"/>
-              <a:t>hace</a:t>
-            </a:r>
-            <a:r>
-              <a:rPr lang="en-US" baseline="0" dirty="0" smtClean="0"/>
-              <a:t> </a:t>
-            </a:r>
-            <a:r>
-              <a:rPr lang="en-US" baseline="0" dirty="0" err="1" smtClean="0"/>
-              <a:t>es</a:t>
-            </a:r>
-            <a:r>
-              <a:rPr lang="en-US" baseline="0" dirty="0" smtClean="0"/>
-              <a:t> </a:t>
-            </a:r>
-            <a:r>
-              <a:rPr lang="en-US" baseline="0" dirty="0" err="1" smtClean="0"/>
-              <a:t>filtrar</a:t>
-            </a:r>
-            <a:r>
-              <a:rPr lang="en-US" baseline="0" dirty="0" smtClean="0"/>
-              <a:t> </a:t>
-            </a:r>
-            <a:r>
-              <a:rPr lang="en-US" baseline="0" dirty="0" err="1" smtClean="0"/>
-              <a:t>una</a:t>
-            </a:r>
-            <a:r>
-              <a:rPr lang="en-US" baseline="0" dirty="0" smtClean="0"/>
-              <a:t> </a:t>
-            </a:r>
-            <a:r>
-              <a:rPr lang="en-US" baseline="0" dirty="0" err="1" smtClean="0"/>
-              <a:t>coleccion</a:t>
-            </a:r>
-            <a:r>
-              <a:rPr lang="en-US" baseline="0" dirty="0" smtClean="0"/>
-              <a:t> </a:t>
-            </a:r>
-            <a:r>
-              <a:rPr lang="en-US" baseline="0" dirty="0" err="1" smtClean="0"/>
-              <a:t>en</a:t>
-            </a:r>
-            <a:r>
-              <a:rPr lang="en-US" baseline="0" dirty="0" smtClean="0"/>
-              <a:t> base a </a:t>
-            </a:r>
-            <a:r>
-              <a:rPr lang="en-US" baseline="0" dirty="0" err="1" smtClean="0"/>
-              <a:t>su</a:t>
-            </a:r>
-            <a:r>
-              <a:rPr lang="en-US" baseline="0" dirty="0" smtClean="0"/>
-              <a:t> </a:t>
-            </a:r>
-            <a:r>
-              <a:rPr lang="en-US" baseline="0" dirty="0" err="1" smtClean="0"/>
-              <a:t>contenido</a:t>
-            </a:r>
-            <a:r>
-              <a:rPr lang="en-US" baseline="0" dirty="0" smtClean="0"/>
-              <a:t>.</a:t>
-            </a:r>
-            <a:endParaRPr lang="es-AR" dirty="0" smtClean="0"/>
-          </a:p>
-          <a:p>
-            <a:endParaRPr lang="es-AR" dirty="0"/>
+            <a:endParaRPr lang="en-US" dirty="0"/>
           </a:p>
         </p:txBody>
       </p:sp>
@@ -2906,7 +776,7 @@
           <a:p>
             <a:fld id="{7D61118C-0B68-45A8-8791-420E0DB4DDEA}" type="slidenum">
               <a:rPr lang="es-AR" smtClean="0"/>
-              <a:t>24</a:t>
+              <a:t>25</a:t>
             </a:fld>
             <a:endParaRPr lang="es-AR"/>
           </a:p>
@@ -2915,1935 +785,7 @@
     </p:spTree>
     <p:extLst>
       <p:ext uri="{BB962C8B-B14F-4D97-AF65-F5344CB8AC3E}">
-        <p14:creationId xmlns:p14="http://schemas.microsoft.com/office/powerpoint/2010/main" val="3724337919"/>
-      </p:ext>
-    </p:extLst>
-  </p:cSld>
-  <p:clrMapOvr>
-    <a:masterClrMapping/>
-  </p:clrMapOvr>
-</p:notes>
-</file>
-
-<file path=ppt/notesSlides/notesSlide4.xml><?xml version="1.0" encoding="utf-8"?>
-<p:notes xmlns:a="http://schemas.openxmlformats.org/drawingml/2006/main" xmlns:r="http://schemas.openxmlformats.org/officeDocument/2006/relationships" xmlns:p="http://schemas.openxmlformats.org/presentationml/2006/main">
-  <p:cSld>
-    <p:spTree>
-      <p:nvGrpSpPr>
-        <p:cNvPr id="1" name=""/>
-        <p:cNvGrpSpPr/>
-        <p:nvPr/>
-      </p:nvGrpSpPr>
-      <p:grpSpPr>
-        <a:xfrm>
-          <a:off x="0" y="0"/>
-          <a:ext cx="0" cy="0"/>
-          <a:chOff x="0" y="0"/>
-          <a:chExt cx="0" cy="0"/>
-        </a:xfrm>
-      </p:grpSpPr>
-      <p:sp>
-        <p:nvSpPr>
-          <p:cNvPr id="2" name="Slide Image Placeholder 1"/>
-          <p:cNvSpPr>
-            <a:spLocks noGrp="1" noRot="1" noChangeAspect="1"/>
-          </p:cNvSpPr>
-          <p:nvPr>
-            <p:ph type="sldImg"/>
-          </p:nvPr>
-        </p:nvSpPr>
-        <p:spPr/>
-      </p:sp>
-      <p:sp>
-        <p:nvSpPr>
-          <p:cNvPr id="3" name="Notes Placeholder 2"/>
-          <p:cNvSpPr>
-            <a:spLocks noGrp="1"/>
-          </p:cNvSpPr>
-          <p:nvPr>
-            <p:ph type="body" idx="1"/>
-          </p:nvPr>
-        </p:nvSpPr>
-        <p:spPr/>
-        <p:txBody>
-          <a:bodyPr/>
-          <a:lstStyle/>
-          <a:p>
-            <a:r>
-              <a:rPr lang="en-US" dirty="0" err="1" smtClean="0"/>
-              <a:t>Por</a:t>
-            </a:r>
-            <a:r>
-              <a:rPr lang="en-US" dirty="0" smtClean="0"/>
-              <a:t> </a:t>
-            </a:r>
-            <a:r>
-              <a:rPr lang="en-US" dirty="0" err="1" smtClean="0"/>
-              <a:t>ejemplo</a:t>
-            </a:r>
-            <a:r>
-              <a:rPr lang="en-US" dirty="0" smtClean="0"/>
-              <a:t>, </a:t>
-            </a:r>
-            <a:r>
-              <a:rPr lang="en-US" dirty="0" err="1" smtClean="0"/>
-              <a:t>en</a:t>
-            </a:r>
-            <a:r>
-              <a:rPr lang="en-US" dirty="0" smtClean="0"/>
-              <a:t> </a:t>
-            </a:r>
-            <a:r>
-              <a:rPr lang="en-US" dirty="0" err="1" smtClean="0"/>
-              <a:t>este</a:t>
-            </a:r>
-            <a:r>
-              <a:rPr lang="en-US" dirty="0" smtClean="0"/>
-              <a:t> </a:t>
-            </a:r>
-            <a:r>
-              <a:rPr lang="en-US" dirty="0" err="1" smtClean="0"/>
-              <a:t>caso</a:t>
-            </a:r>
-            <a:r>
-              <a:rPr lang="en-US" dirty="0" smtClean="0"/>
-              <a:t> </a:t>
-            </a:r>
-            <a:r>
-              <a:rPr lang="en-US" dirty="0" err="1" smtClean="0"/>
-              <a:t>tenemos</a:t>
-            </a:r>
-            <a:r>
-              <a:rPr lang="en-US" dirty="0" smtClean="0"/>
-              <a:t> </a:t>
-            </a:r>
-            <a:r>
-              <a:rPr lang="en-US" dirty="0" err="1" smtClean="0"/>
-              <a:t>una</a:t>
-            </a:r>
-            <a:r>
-              <a:rPr lang="en-US" dirty="0" smtClean="0"/>
-              <a:t> </a:t>
-            </a:r>
-            <a:r>
-              <a:rPr lang="en-US" dirty="0" err="1" smtClean="0"/>
-              <a:t>coleccion</a:t>
-            </a:r>
-            <a:r>
-              <a:rPr lang="en-US" dirty="0" smtClean="0"/>
-              <a:t> de strings.</a:t>
-            </a:r>
-          </a:p>
-          <a:p>
-            <a:r>
-              <a:rPr lang="en-US" dirty="0" smtClean="0"/>
-              <a:t>Lo </a:t>
-            </a:r>
-            <a:r>
-              <a:rPr lang="en-US" dirty="0" err="1" smtClean="0"/>
-              <a:t>que</a:t>
-            </a:r>
-            <a:r>
-              <a:rPr lang="en-US" dirty="0" smtClean="0"/>
-              <a:t> </a:t>
-            </a:r>
-            <a:r>
-              <a:rPr lang="en-US" dirty="0" err="1" smtClean="0"/>
-              <a:t>hacemos</a:t>
-            </a:r>
-            <a:r>
-              <a:rPr lang="en-US" dirty="0" smtClean="0"/>
-              <a:t> </a:t>
-            </a:r>
-            <a:r>
-              <a:rPr lang="en-US" dirty="0" err="1" smtClean="0"/>
-              <a:t>es</a:t>
-            </a:r>
-            <a:r>
-              <a:rPr lang="en-US" dirty="0" smtClean="0"/>
-              <a:t> </a:t>
-            </a:r>
-            <a:r>
-              <a:rPr lang="en-US" dirty="0" err="1" smtClean="0"/>
-              <a:t>filtrar</a:t>
-            </a:r>
-            <a:r>
-              <a:rPr lang="en-US" dirty="0" smtClean="0"/>
-              <a:t> </a:t>
-            </a:r>
-            <a:r>
-              <a:rPr lang="en-US" dirty="0" err="1" smtClean="0"/>
-              <a:t>esa</a:t>
-            </a:r>
-            <a:r>
-              <a:rPr lang="en-US" dirty="0" smtClean="0"/>
-              <a:t> </a:t>
-            </a:r>
-            <a:r>
-              <a:rPr lang="en-US" dirty="0" err="1" smtClean="0"/>
-              <a:t>coleccion</a:t>
-            </a:r>
-            <a:r>
-              <a:rPr lang="en-US" dirty="0" smtClean="0"/>
-              <a:t> </a:t>
-            </a:r>
-            <a:r>
-              <a:rPr lang="en-US" dirty="0" err="1" smtClean="0"/>
-              <a:t>en</a:t>
-            </a:r>
-            <a:r>
-              <a:rPr lang="en-US" dirty="0" smtClean="0"/>
-              <a:t> base a un </a:t>
-            </a:r>
-            <a:r>
-              <a:rPr lang="en-US" dirty="0" err="1" smtClean="0"/>
-              <a:t>texto</a:t>
-            </a:r>
-            <a:r>
-              <a:rPr lang="en-US" dirty="0" smtClean="0"/>
-              <a:t>. </a:t>
-            </a:r>
-            <a:r>
-              <a:rPr lang="en-US" dirty="0" err="1" smtClean="0"/>
-              <a:t>Por</a:t>
-            </a:r>
-            <a:r>
-              <a:rPr lang="en-US" dirty="0" smtClean="0"/>
-              <a:t> </a:t>
-            </a:r>
-            <a:r>
-              <a:rPr lang="en-US" dirty="0" err="1" smtClean="0"/>
-              <a:t>ejempl</a:t>
-            </a:r>
-            <a:r>
-              <a:rPr lang="en-US" dirty="0" smtClean="0"/>
-              <a:t> </a:t>
-            </a:r>
-            <a:r>
-              <a:rPr lang="en-US" dirty="0" err="1" smtClean="0"/>
-              <a:t>si</a:t>
-            </a:r>
-            <a:r>
-              <a:rPr lang="en-US" dirty="0" smtClean="0"/>
-              <a:t> </a:t>
-            </a:r>
-            <a:r>
-              <a:rPr lang="en-US" dirty="0" err="1" smtClean="0"/>
-              <a:t>ingresamos</a:t>
-            </a:r>
-            <a:r>
-              <a:rPr lang="en-US" dirty="0" smtClean="0"/>
-              <a:t> “</a:t>
-            </a:r>
-            <a:r>
-              <a:rPr lang="en-US" dirty="0" err="1" smtClean="0"/>
-              <a:t>na</a:t>
-            </a:r>
-            <a:r>
-              <a:rPr lang="en-US" dirty="0" smtClean="0"/>
-              <a:t>”, se</a:t>
-            </a:r>
-            <a:r>
-              <a:rPr lang="en-US" baseline="0" dirty="0" smtClean="0"/>
-              <a:t> </a:t>
-            </a:r>
-            <a:r>
-              <a:rPr lang="en-US" baseline="0" dirty="0" err="1" smtClean="0"/>
-              <a:t>filtraria</a:t>
-            </a:r>
-            <a:r>
-              <a:rPr lang="en-US" baseline="0" dirty="0" smtClean="0"/>
-              <a:t> la </a:t>
-            </a:r>
-            <a:r>
-              <a:rPr lang="en-US" baseline="0" dirty="0" err="1" smtClean="0"/>
-              <a:t>coleccion</a:t>
-            </a:r>
-            <a:r>
-              <a:rPr lang="en-US" baseline="0" dirty="0" smtClean="0"/>
-              <a:t> </a:t>
-            </a:r>
-            <a:r>
-              <a:rPr lang="en-US" baseline="0" dirty="0" err="1" smtClean="0"/>
-              <a:t>dejando</a:t>
-            </a:r>
-            <a:r>
-              <a:rPr lang="en-US" baseline="0" dirty="0" smtClean="0"/>
-              <a:t> solo los </a:t>
-            </a:r>
-            <a:r>
-              <a:rPr lang="en-US" baseline="0" dirty="0" err="1" smtClean="0"/>
-              <a:t>elementos</a:t>
-            </a:r>
-            <a:r>
-              <a:rPr lang="en-US" baseline="0" dirty="0" smtClean="0"/>
-              <a:t> </a:t>
-            </a:r>
-            <a:r>
-              <a:rPr lang="en-US" baseline="0" dirty="0" err="1" smtClean="0"/>
-              <a:t>que</a:t>
-            </a:r>
-            <a:r>
-              <a:rPr lang="en-US" baseline="0" dirty="0" smtClean="0"/>
-              <a:t> </a:t>
-            </a:r>
-            <a:r>
-              <a:rPr lang="en-US" baseline="0" dirty="0" err="1" smtClean="0"/>
-              <a:t>coinciden</a:t>
-            </a:r>
-            <a:r>
-              <a:rPr lang="en-US" baseline="0" dirty="0" smtClean="0"/>
-              <a:t> con el </a:t>
-            </a:r>
-            <a:r>
-              <a:rPr lang="en-US" baseline="0" dirty="0" err="1" smtClean="0"/>
-              <a:t>texto</a:t>
-            </a:r>
-            <a:r>
-              <a:rPr lang="en-US" baseline="0" dirty="0" smtClean="0"/>
-              <a:t> </a:t>
-            </a:r>
-            <a:r>
-              <a:rPr lang="en-US" baseline="0" dirty="0" err="1" smtClean="0"/>
-              <a:t>que</a:t>
-            </a:r>
-            <a:r>
-              <a:rPr lang="en-US" baseline="0" dirty="0" smtClean="0"/>
-              <a:t> </a:t>
-            </a:r>
-            <a:r>
-              <a:rPr lang="en-US" baseline="0" dirty="0" err="1" smtClean="0"/>
-              <a:t>usamos</a:t>
-            </a:r>
-            <a:r>
-              <a:rPr lang="en-US" baseline="0" dirty="0" smtClean="0"/>
-              <a:t> para </a:t>
-            </a:r>
-            <a:r>
-              <a:rPr lang="en-US" baseline="0" dirty="0" err="1" smtClean="0"/>
-              <a:t>filtrar</a:t>
-            </a:r>
-            <a:r>
-              <a:rPr lang="en-US" baseline="0" dirty="0" smtClean="0"/>
-              <a:t>, </a:t>
-            </a:r>
-            <a:r>
-              <a:rPr lang="en-US" baseline="0" dirty="0" err="1" smtClean="0"/>
-              <a:t>que</a:t>
-            </a:r>
-            <a:r>
-              <a:rPr lang="en-US" baseline="0" dirty="0" smtClean="0"/>
-              <a:t> </a:t>
-            </a:r>
-            <a:r>
-              <a:rPr lang="en-US" baseline="0" dirty="0" err="1" smtClean="0"/>
-              <a:t>serian</a:t>
-            </a:r>
-            <a:r>
-              <a:rPr lang="en-US" baseline="0" dirty="0" smtClean="0"/>
-              <a:t> “</a:t>
-            </a:r>
-            <a:r>
-              <a:rPr lang="en-US" baseline="0" dirty="0" err="1" smtClean="0"/>
-              <a:t>manzana</a:t>
-            </a:r>
-            <a:r>
-              <a:rPr lang="en-US" baseline="0" dirty="0" smtClean="0"/>
-              <a:t>” y “banana”.</a:t>
-            </a:r>
-          </a:p>
-          <a:p>
-            <a:endParaRPr lang="en-US" dirty="0"/>
-          </a:p>
-        </p:txBody>
-      </p:sp>
-      <p:sp>
-        <p:nvSpPr>
-          <p:cNvPr id="4" name="Slide Number Placeholder 3"/>
-          <p:cNvSpPr>
-            <a:spLocks noGrp="1"/>
-          </p:cNvSpPr>
-          <p:nvPr>
-            <p:ph type="sldNum" sz="quarter" idx="10"/>
-          </p:nvPr>
-        </p:nvSpPr>
-        <p:spPr/>
-        <p:txBody>
-          <a:bodyPr/>
-          <a:lstStyle/>
-          <a:p>
-            <a:fld id="{7D61118C-0B68-45A8-8791-420E0DB4DDEA}" type="slidenum">
-              <a:rPr lang="es-AR" smtClean="0"/>
-              <a:t>25</a:t>
-            </a:fld>
-            <a:endParaRPr lang="es-AR"/>
-          </a:p>
-        </p:txBody>
-      </p:sp>
-    </p:spTree>
-    <p:extLst>
-      <p:ext uri="{BB962C8B-B14F-4D97-AF65-F5344CB8AC3E}">
-        <p14:creationId xmlns:p14="http://schemas.microsoft.com/office/powerpoint/2010/main" val="1868770358"/>
-      </p:ext>
-    </p:extLst>
-  </p:cSld>
-  <p:clrMapOvr>
-    <a:masterClrMapping/>
-  </p:clrMapOvr>
-</p:notes>
-</file>
-
-<file path=ppt/notesSlides/notesSlide5.xml><?xml version="1.0" encoding="utf-8"?>
-<p:notes xmlns:a="http://schemas.openxmlformats.org/drawingml/2006/main" xmlns:r="http://schemas.openxmlformats.org/officeDocument/2006/relationships" xmlns:p="http://schemas.openxmlformats.org/presentationml/2006/main">
-  <p:cSld>
-    <p:spTree>
-      <p:nvGrpSpPr>
-        <p:cNvPr id="1" name=""/>
-        <p:cNvGrpSpPr/>
-        <p:nvPr/>
-      </p:nvGrpSpPr>
-      <p:grpSpPr>
-        <a:xfrm>
-          <a:off x="0" y="0"/>
-          <a:ext cx="0" cy="0"/>
-          <a:chOff x="0" y="0"/>
-          <a:chExt cx="0" cy="0"/>
-        </a:xfrm>
-      </p:grpSpPr>
-      <p:sp>
-        <p:nvSpPr>
-          <p:cNvPr id="2" name="Slide Image Placeholder 1"/>
-          <p:cNvSpPr>
-            <a:spLocks noGrp="1" noRot="1" noChangeAspect="1"/>
-          </p:cNvSpPr>
-          <p:nvPr>
-            <p:ph type="sldImg"/>
-          </p:nvPr>
-        </p:nvSpPr>
-        <p:spPr/>
-      </p:sp>
-      <p:sp>
-        <p:nvSpPr>
-          <p:cNvPr id="3" name="Notes Placeholder 2"/>
-          <p:cNvSpPr>
-            <a:spLocks noGrp="1"/>
-          </p:cNvSpPr>
-          <p:nvPr>
-            <p:ph type="body" idx="1"/>
-          </p:nvPr>
-        </p:nvSpPr>
-        <p:spPr/>
-        <p:txBody>
-          <a:bodyPr/>
-          <a:lstStyle/>
-          <a:p>
-            <a:r>
-              <a:rPr lang="en-US" baseline="0" dirty="0" err="1" smtClean="0"/>
-              <a:t>Ahora</a:t>
-            </a:r>
-            <a:r>
-              <a:rPr lang="en-US" baseline="0" dirty="0" smtClean="0"/>
-              <a:t> </a:t>
-            </a:r>
-            <a:r>
-              <a:rPr lang="en-US" baseline="0" dirty="0" err="1" smtClean="0"/>
-              <a:t>vamos</a:t>
-            </a:r>
-            <a:r>
-              <a:rPr lang="en-US" baseline="0" dirty="0" smtClean="0"/>
-              <a:t> a </a:t>
-            </a:r>
-            <a:r>
-              <a:rPr lang="en-US" baseline="0" dirty="0" err="1" smtClean="0"/>
-              <a:t>cambiar</a:t>
-            </a:r>
-            <a:r>
-              <a:rPr lang="en-US" baseline="0" dirty="0" smtClean="0"/>
-              <a:t> el </a:t>
-            </a:r>
-            <a:r>
-              <a:rPr lang="en-US" baseline="0" dirty="0" err="1" smtClean="0"/>
-              <a:t>ejemplo</a:t>
-            </a:r>
-            <a:r>
-              <a:rPr lang="en-US" baseline="0" dirty="0" smtClean="0"/>
-              <a:t>, </a:t>
-            </a:r>
-            <a:r>
-              <a:rPr lang="en-US" baseline="0" dirty="0" err="1" smtClean="0"/>
-              <a:t>en</a:t>
-            </a:r>
-            <a:r>
-              <a:rPr lang="en-US" baseline="0" dirty="0" smtClean="0"/>
-              <a:t> </a:t>
-            </a:r>
-            <a:r>
-              <a:rPr lang="en-US" baseline="0" dirty="0" err="1" smtClean="0"/>
-              <a:t>vez</a:t>
-            </a:r>
-            <a:r>
-              <a:rPr lang="en-US" baseline="0" dirty="0" smtClean="0"/>
-              <a:t> de </a:t>
-            </a:r>
-            <a:r>
-              <a:rPr lang="en-US" baseline="0" dirty="0" err="1" smtClean="0"/>
-              <a:t>usar</a:t>
-            </a:r>
-            <a:r>
-              <a:rPr lang="en-US" baseline="0" dirty="0" smtClean="0"/>
-              <a:t> </a:t>
-            </a:r>
-            <a:r>
-              <a:rPr lang="en-US" baseline="0" dirty="0" err="1" smtClean="0"/>
-              <a:t>una</a:t>
-            </a:r>
-            <a:r>
-              <a:rPr lang="en-US" baseline="0" dirty="0" smtClean="0"/>
-              <a:t> </a:t>
-            </a:r>
-            <a:r>
-              <a:rPr lang="en-US" baseline="0" dirty="0" err="1" smtClean="0"/>
-              <a:t>lista</a:t>
-            </a:r>
-            <a:r>
-              <a:rPr lang="en-US" baseline="0" dirty="0" smtClean="0"/>
-              <a:t> de string </a:t>
-            </a:r>
-            <a:r>
-              <a:rPr lang="en-US" baseline="0" dirty="0" err="1" smtClean="0"/>
-              <a:t>vamos</a:t>
-            </a:r>
-            <a:r>
-              <a:rPr lang="en-US" baseline="0" dirty="0" smtClean="0"/>
-              <a:t> a </a:t>
-            </a:r>
-            <a:r>
-              <a:rPr lang="en-US" baseline="0" dirty="0" err="1" smtClean="0"/>
-              <a:t>usar</a:t>
-            </a:r>
-            <a:r>
-              <a:rPr lang="en-US" baseline="0" dirty="0" smtClean="0"/>
-              <a:t> </a:t>
-            </a:r>
-            <a:r>
-              <a:rPr lang="en-US" baseline="0" dirty="0" err="1" smtClean="0"/>
-              <a:t>una</a:t>
-            </a:r>
-            <a:r>
-              <a:rPr lang="en-US" baseline="0" dirty="0" smtClean="0"/>
-              <a:t> </a:t>
-            </a:r>
-            <a:r>
-              <a:rPr lang="en-US" baseline="0" dirty="0" err="1" smtClean="0"/>
-              <a:t>lista</a:t>
-            </a:r>
-            <a:r>
-              <a:rPr lang="en-US" baseline="0" dirty="0" smtClean="0"/>
-              <a:t> de </a:t>
-            </a:r>
-            <a:r>
-              <a:rPr lang="en-US" baseline="0" dirty="0" err="1" smtClean="0"/>
-              <a:t>objetos</a:t>
-            </a:r>
-            <a:r>
-              <a:rPr lang="en-US" baseline="0" dirty="0" smtClean="0"/>
-              <a:t>.</a:t>
-            </a:r>
-          </a:p>
-          <a:p>
-            <a:r>
-              <a:rPr lang="en-US" baseline="0" dirty="0" err="1" smtClean="0"/>
-              <a:t>Cada</a:t>
-            </a:r>
-            <a:r>
-              <a:rPr lang="en-US" baseline="0" dirty="0" smtClean="0"/>
-              <a:t> </a:t>
-            </a:r>
-            <a:r>
-              <a:rPr lang="en-US" baseline="0" dirty="0" err="1" smtClean="0"/>
-              <a:t>objeto</a:t>
-            </a:r>
-            <a:r>
-              <a:rPr lang="en-US" baseline="0" dirty="0" smtClean="0"/>
-              <a:t> </a:t>
-            </a:r>
-            <a:r>
-              <a:rPr lang="en-US" baseline="0" dirty="0" err="1" smtClean="0"/>
-              <a:t>tiene</a:t>
-            </a:r>
-            <a:r>
-              <a:rPr lang="en-US" baseline="0" dirty="0" smtClean="0"/>
-              <a:t> 2 </a:t>
-            </a:r>
-            <a:r>
-              <a:rPr lang="en-US" baseline="0" dirty="0" err="1" smtClean="0"/>
-              <a:t>propiedades</a:t>
-            </a:r>
-            <a:r>
-              <a:rPr lang="en-US" baseline="0" dirty="0" smtClean="0"/>
-              <a:t> (</a:t>
-            </a:r>
-            <a:r>
-              <a:rPr lang="en-US" baseline="0" dirty="0" err="1" smtClean="0"/>
-              <a:t>importantes</a:t>
-            </a:r>
-            <a:r>
-              <a:rPr lang="en-US" baseline="0" dirty="0" smtClean="0"/>
-              <a:t>): </a:t>
-            </a:r>
-            <a:r>
-              <a:rPr lang="en-US" baseline="0" dirty="0" err="1" smtClean="0"/>
-              <a:t>título</a:t>
-            </a:r>
-            <a:r>
-              <a:rPr lang="en-US" baseline="0" dirty="0" smtClean="0"/>
-              <a:t> y </a:t>
-            </a:r>
-            <a:r>
-              <a:rPr lang="en-US" baseline="0" dirty="0" err="1" smtClean="0"/>
-              <a:t>genero</a:t>
-            </a:r>
-            <a:r>
-              <a:rPr lang="en-US" baseline="0" dirty="0" smtClean="0"/>
-              <a:t>, y </a:t>
-            </a:r>
-            <a:r>
-              <a:rPr lang="en-US" baseline="0" dirty="0" err="1" smtClean="0"/>
-              <a:t>vamos</a:t>
-            </a:r>
-            <a:r>
-              <a:rPr lang="en-US" baseline="0" dirty="0" smtClean="0"/>
-              <a:t> a </a:t>
-            </a:r>
-            <a:r>
-              <a:rPr lang="en-US" baseline="0" dirty="0" err="1" smtClean="0"/>
-              <a:t>filtrar</a:t>
-            </a:r>
-            <a:r>
-              <a:rPr lang="en-US" baseline="0" dirty="0" smtClean="0"/>
-              <a:t> </a:t>
-            </a:r>
-            <a:r>
-              <a:rPr lang="en-US" baseline="0" dirty="0" err="1" smtClean="0"/>
-              <a:t>por</a:t>
-            </a:r>
-            <a:r>
-              <a:rPr lang="en-US" baseline="0" dirty="0" smtClean="0"/>
-              <a:t> </a:t>
-            </a:r>
-            <a:r>
-              <a:rPr lang="en-US" baseline="0" dirty="0" err="1" smtClean="0"/>
-              <a:t>ambas</a:t>
-            </a:r>
-            <a:r>
-              <a:rPr lang="en-US" baseline="0" dirty="0" smtClean="0"/>
-              <a:t>.</a:t>
-            </a:r>
-          </a:p>
-          <a:p>
-            <a:endParaRPr lang="es-AR" dirty="0"/>
-          </a:p>
-        </p:txBody>
-      </p:sp>
-      <p:sp>
-        <p:nvSpPr>
-          <p:cNvPr id="4" name="Slide Number Placeholder 3"/>
-          <p:cNvSpPr>
-            <a:spLocks noGrp="1"/>
-          </p:cNvSpPr>
-          <p:nvPr>
-            <p:ph type="sldNum" sz="quarter" idx="10"/>
-          </p:nvPr>
-        </p:nvSpPr>
-        <p:spPr/>
-        <p:txBody>
-          <a:bodyPr/>
-          <a:lstStyle/>
-          <a:p>
-            <a:fld id="{7D61118C-0B68-45A8-8791-420E0DB4DDEA}" type="slidenum">
-              <a:rPr lang="es-AR" smtClean="0"/>
-              <a:t>26</a:t>
-            </a:fld>
-            <a:endParaRPr lang="es-AR"/>
-          </a:p>
-        </p:txBody>
-      </p:sp>
-    </p:spTree>
-    <p:extLst>
-      <p:ext uri="{BB962C8B-B14F-4D97-AF65-F5344CB8AC3E}">
-        <p14:creationId xmlns:p14="http://schemas.microsoft.com/office/powerpoint/2010/main" val="25107214"/>
-      </p:ext>
-    </p:extLst>
-  </p:cSld>
-  <p:clrMapOvr>
-    <a:masterClrMapping/>
-  </p:clrMapOvr>
-</p:notes>
-</file>
-
-<file path=ppt/notesSlides/notesSlide6.xml><?xml version="1.0" encoding="utf-8"?>
-<p:notes xmlns:a="http://schemas.openxmlformats.org/drawingml/2006/main" xmlns:r="http://schemas.openxmlformats.org/officeDocument/2006/relationships" xmlns:p="http://schemas.openxmlformats.org/presentationml/2006/main">
-  <p:cSld>
-    <p:spTree>
-      <p:nvGrpSpPr>
-        <p:cNvPr id="1" name=""/>
-        <p:cNvGrpSpPr/>
-        <p:nvPr/>
-      </p:nvGrpSpPr>
-      <p:grpSpPr>
-        <a:xfrm>
-          <a:off x="0" y="0"/>
-          <a:ext cx="0" cy="0"/>
-          <a:chOff x="0" y="0"/>
-          <a:chExt cx="0" cy="0"/>
-        </a:xfrm>
-      </p:grpSpPr>
-      <p:sp>
-        <p:nvSpPr>
-          <p:cNvPr id="2" name="Slide Image Placeholder 1"/>
-          <p:cNvSpPr>
-            <a:spLocks noGrp="1" noRot="1" noChangeAspect="1"/>
-          </p:cNvSpPr>
-          <p:nvPr>
-            <p:ph type="sldImg"/>
-          </p:nvPr>
-        </p:nvSpPr>
-        <p:spPr/>
-      </p:sp>
-      <p:sp>
-        <p:nvSpPr>
-          <p:cNvPr id="3" name="Notes Placeholder 2"/>
-          <p:cNvSpPr>
-            <a:spLocks noGrp="1"/>
-          </p:cNvSpPr>
-          <p:nvPr>
-            <p:ph type="body" idx="1"/>
-          </p:nvPr>
-        </p:nvSpPr>
-        <p:spPr/>
-        <p:txBody>
-          <a:bodyPr/>
-          <a:lstStyle/>
-          <a:p>
-            <a:r>
-              <a:rPr lang="en-US" dirty="0" err="1" smtClean="0"/>
-              <a:t>En</a:t>
-            </a:r>
-            <a:r>
-              <a:rPr lang="en-US" dirty="0" smtClean="0"/>
-              <a:t> </a:t>
-            </a:r>
-            <a:r>
-              <a:rPr lang="en-US" dirty="0" err="1" smtClean="0"/>
-              <a:t>este</a:t>
-            </a:r>
-            <a:r>
-              <a:rPr lang="en-US" dirty="0" smtClean="0"/>
-              <a:t> </a:t>
-            </a:r>
-            <a:r>
-              <a:rPr lang="en-US" dirty="0" err="1" smtClean="0"/>
-              <a:t>caso</a:t>
-            </a:r>
-            <a:r>
-              <a:rPr lang="en-US" dirty="0" smtClean="0"/>
-              <a:t> a filter le </a:t>
-            </a:r>
-            <a:r>
-              <a:rPr lang="en-US" dirty="0" err="1" smtClean="0"/>
-              <a:t>pasamos</a:t>
-            </a:r>
-            <a:r>
-              <a:rPr lang="en-US" dirty="0" smtClean="0"/>
-              <a:t> </a:t>
-            </a:r>
-            <a:r>
-              <a:rPr lang="en-US" dirty="0" err="1" smtClean="0"/>
-              <a:t>como</a:t>
-            </a:r>
-            <a:r>
-              <a:rPr lang="en-US" dirty="0" smtClean="0"/>
-              <a:t> </a:t>
-            </a:r>
-            <a:r>
-              <a:rPr lang="en-US" dirty="0" err="1" smtClean="0"/>
-              <a:t>parametro</a:t>
-            </a:r>
-            <a:r>
-              <a:rPr lang="en-US" dirty="0" smtClean="0"/>
-              <a:t> un </a:t>
-            </a:r>
-            <a:r>
-              <a:rPr lang="en-US" dirty="0" err="1" smtClean="0"/>
-              <a:t>objeto</a:t>
-            </a:r>
-            <a:r>
-              <a:rPr lang="en-US" dirty="0" smtClean="0"/>
-              <a:t> con la </a:t>
-            </a:r>
-            <a:r>
-              <a:rPr lang="en-US" dirty="0" err="1" smtClean="0"/>
-              <a:t>misma</a:t>
-            </a:r>
-            <a:r>
-              <a:rPr lang="en-US" dirty="0" smtClean="0"/>
-              <a:t> </a:t>
-            </a:r>
-            <a:r>
-              <a:rPr lang="en-US" dirty="0" err="1" smtClean="0"/>
-              <a:t>estructura</a:t>
-            </a:r>
-            <a:r>
-              <a:rPr lang="en-US" dirty="0" smtClean="0"/>
-              <a:t> </a:t>
-            </a:r>
-            <a:r>
-              <a:rPr lang="en-US" dirty="0" err="1" smtClean="0"/>
-              <a:t>que</a:t>
-            </a:r>
-            <a:r>
-              <a:rPr lang="en-US" dirty="0" smtClean="0"/>
-              <a:t> los </a:t>
-            </a:r>
-            <a:r>
-              <a:rPr lang="en-US" dirty="0" err="1" smtClean="0"/>
-              <a:t>objetos</a:t>
-            </a:r>
-            <a:r>
-              <a:rPr lang="en-US" dirty="0" smtClean="0"/>
-              <a:t> </a:t>
-            </a:r>
-            <a:r>
-              <a:rPr lang="en-US" dirty="0" err="1" smtClean="0"/>
-              <a:t>que</a:t>
-            </a:r>
-            <a:r>
-              <a:rPr lang="en-US" dirty="0" smtClean="0"/>
-              <a:t> </a:t>
-            </a:r>
-            <a:r>
-              <a:rPr lang="en-US" dirty="0" err="1" smtClean="0"/>
-              <a:t>estamos</a:t>
-            </a:r>
-            <a:r>
-              <a:rPr lang="en-US" dirty="0" smtClean="0"/>
-              <a:t> </a:t>
-            </a:r>
-            <a:r>
-              <a:rPr lang="en-US" dirty="0" err="1" smtClean="0"/>
-              <a:t>fitrando</a:t>
-            </a:r>
-            <a:r>
-              <a:rPr lang="en-US" dirty="0" smtClean="0"/>
-              <a:t>.</a:t>
-            </a:r>
-          </a:p>
-          <a:p>
-            <a:r>
-              <a:rPr lang="en-US" baseline="0" dirty="0" smtClean="0"/>
-              <a:t>Los </a:t>
-            </a:r>
-            <a:r>
-              <a:rPr lang="en-US" baseline="0" dirty="0" err="1" smtClean="0"/>
-              <a:t>valores</a:t>
-            </a:r>
-            <a:r>
-              <a:rPr lang="en-US" baseline="0" dirty="0" smtClean="0"/>
-              <a:t> </a:t>
-            </a:r>
-            <a:r>
-              <a:rPr lang="en-US" baseline="0" dirty="0" err="1" smtClean="0"/>
-              <a:t>que</a:t>
-            </a:r>
-            <a:r>
-              <a:rPr lang="en-US" baseline="0" dirty="0" smtClean="0"/>
-              <a:t> </a:t>
-            </a:r>
-            <a:r>
-              <a:rPr lang="en-US" baseline="0" dirty="0" err="1" smtClean="0"/>
-              <a:t>pongamos</a:t>
-            </a:r>
-            <a:r>
-              <a:rPr lang="en-US" baseline="0" dirty="0" smtClean="0"/>
-              <a:t> </a:t>
-            </a:r>
-            <a:r>
-              <a:rPr lang="en-US" baseline="0" dirty="0" err="1" smtClean="0"/>
-              <a:t>en</a:t>
-            </a:r>
-            <a:r>
-              <a:rPr lang="en-US" baseline="0" dirty="0" smtClean="0"/>
-              <a:t> </a:t>
-            </a:r>
-            <a:r>
-              <a:rPr lang="en-US" baseline="0" dirty="0" err="1" smtClean="0"/>
-              <a:t>cada</a:t>
-            </a:r>
-            <a:r>
-              <a:rPr lang="en-US" baseline="0" dirty="0" smtClean="0"/>
-              <a:t> </a:t>
-            </a:r>
-            <a:r>
-              <a:rPr lang="en-US" baseline="0" dirty="0" err="1" smtClean="0"/>
-              <a:t>propiedad</a:t>
-            </a:r>
-            <a:r>
-              <a:rPr lang="en-US" baseline="0" dirty="0" smtClean="0"/>
-              <a:t> del </a:t>
-            </a:r>
-            <a:r>
-              <a:rPr lang="en-US" baseline="0" dirty="0" err="1" smtClean="0"/>
-              <a:t>objeto</a:t>
-            </a:r>
-            <a:r>
-              <a:rPr lang="en-US" baseline="0" dirty="0" smtClean="0"/>
-              <a:t> son los </a:t>
-            </a:r>
-            <a:r>
-              <a:rPr lang="en-US" baseline="0" dirty="0" err="1" smtClean="0"/>
-              <a:t>que</a:t>
-            </a:r>
-            <a:r>
-              <a:rPr lang="en-US" baseline="0" dirty="0" smtClean="0"/>
-              <a:t> se van a </a:t>
-            </a:r>
-            <a:r>
-              <a:rPr lang="en-US" baseline="0" dirty="0" err="1" smtClean="0"/>
-              <a:t>comparar</a:t>
-            </a:r>
-            <a:r>
-              <a:rPr lang="en-US" baseline="0" dirty="0" smtClean="0"/>
-              <a:t> contra </a:t>
-            </a:r>
-            <a:r>
-              <a:rPr lang="en-US" baseline="0" dirty="0" err="1" smtClean="0"/>
-              <a:t>cada</a:t>
-            </a:r>
-            <a:r>
-              <a:rPr lang="en-US" baseline="0" dirty="0" smtClean="0"/>
-              <a:t> </a:t>
-            </a:r>
-            <a:r>
-              <a:rPr lang="en-US" baseline="0" dirty="0" err="1" smtClean="0"/>
-              <a:t>elemento</a:t>
-            </a:r>
-            <a:r>
-              <a:rPr lang="en-US" baseline="0" dirty="0" smtClean="0"/>
-              <a:t> de la </a:t>
-            </a:r>
-            <a:r>
-              <a:rPr lang="en-US" baseline="0" dirty="0" err="1" smtClean="0"/>
-              <a:t>coleccion</a:t>
-            </a:r>
-            <a:r>
-              <a:rPr lang="en-US" baseline="0" dirty="0" smtClean="0"/>
-              <a:t>.</a:t>
-            </a:r>
-          </a:p>
-          <a:p>
-            <a:r>
-              <a:rPr lang="en-US" baseline="0" dirty="0" err="1" smtClean="0"/>
-              <a:t>En</a:t>
-            </a:r>
-            <a:r>
-              <a:rPr lang="en-US" baseline="0" dirty="0" smtClean="0"/>
-              <a:t> </a:t>
-            </a:r>
-            <a:r>
-              <a:rPr lang="en-US" baseline="0" dirty="0" err="1" smtClean="0"/>
-              <a:t>este</a:t>
-            </a:r>
-            <a:r>
-              <a:rPr lang="en-US" baseline="0" dirty="0" smtClean="0"/>
-              <a:t> </a:t>
-            </a:r>
-            <a:r>
-              <a:rPr lang="en-US" baseline="0" dirty="0" err="1" smtClean="0"/>
-              <a:t>caso</a:t>
-            </a:r>
-            <a:r>
-              <a:rPr lang="en-US" baseline="0" dirty="0" smtClean="0"/>
-              <a:t>, </a:t>
-            </a:r>
-            <a:r>
-              <a:rPr lang="en-US" baseline="0" dirty="0" err="1" smtClean="0"/>
-              <a:t>esos</a:t>
-            </a:r>
-            <a:r>
-              <a:rPr lang="en-US" baseline="0" dirty="0" smtClean="0"/>
-              <a:t> </a:t>
-            </a:r>
-            <a:r>
-              <a:rPr lang="en-US" baseline="0" dirty="0" err="1" smtClean="0"/>
-              <a:t>valores</a:t>
-            </a:r>
-            <a:r>
-              <a:rPr lang="en-US" baseline="0" dirty="0" smtClean="0"/>
-              <a:t> los </a:t>
-            </a:r>
-            <a:r>
-              <a:rPr lang="en-US" baseline="0" dirty="0" err="1" smtClean="0"/>
-              <a:t>sacamos</a:t>
-            </a:r>
-            <a:r>
-              <a:rPr lang="en-US" baseline="0" dirty="0" smtClean="0"/>
-              <a:t> de 2 inputs, </a:t>
-            </a:r>
-            <a:r>
-              <a:rPr lang="en-US" baseline="0" dirty="0" err="1" smtClean="0"/>
-              <a:t>entonces</a:t>
-            </a:r>
-            <a:r>
-              <a:rPr lang="en-US" baseline="0" dirty="0" smtClean="0"/>
-              <a:t> </a:t>
-            </a:r>
-            <a:r>
-              <a:rPr lang="en-US" baseline="0" dirty="0" err="1" smtClean="0"/>
-              <a:t>cuando</a:t>
-            </a:r>
-            <a:r>
-              <a:rPr lang="en-US" baseline="0" dirty="0" smtClean="0"/>
-              <a:t> </a:t>
-            </a:r>
-            <a:r>
-              <a:rPr lang="en-US" baseline="0" dirty="0" err="1" smtClean="0"/>
-              <a:t>ingresamos</a:t>
-            </a:r>
-            <a:r>
-              <a:rPr lang="en-US" baseline="0" dirty="0" smtClean="0"/>
-              <a:t> </a:t>
-            </a:r>
-            <a:r>
-              <a:rPr lang="en-US" baseline="0" dirty="0" err="1" smtClean="0"/>
-              <a:t>valores</a:t>
-            </a:r>
-            <a:r>
-              <a:rPr lang="en-US" baseline="0" dirty="0" smtClean="0"/>
-              <a:t> </a:t>
-            </a:r>
-            <a:r>
-              <a:rPr lang="en-US" baseline="0" dirty="0" err="1" smtClean="0"/>
-              <a:t>en</a:t>
-            </a:r>
-            <a:r>
-              <a:rPr lang="en-US" baseline="0" dirty="0" smtClean="0"/>
-              <a:t> </a:t>
-            </a:r>
-            <a:r>
-              <a:rPr lang="en-US" baseline="0" dirty="0" err="1" smtClean="0"/>
-              <a:t>ellos</a:t>
-            </a:r>
-            <a:r>
-              <a:rPr lang="en-US" baseline="0" dirty="0" smtClean="0"/>
-              <a:t> se van a </a:t>
-            </a:r>
-            <a:r>
-              <a:rPr lang="en-US" baseline="0" dirty="0" err="1" smtClean="0"/>
-              <a:t>mostrar</a:t>
-            </a:r>
-            <a:r>
-              <a:rPr lang="en-US" baseline="0" dirty="0" smtClean="0"/>
-              <a:t> </a:t>
-            </a:r>
-            <a:r>
-              <a:rPr lang="en-US" baseline="0" dirty="0" err="1" smtClean="0"/>
-              <a:t>aquellos</a:t>
-            </a:r>
-            <a:r>
-              <a:rPr lang="en-US" baseline="0" dirty="0" smtClean="0"/>
-              <a:t> </a:t>
-            </a:r>
-            <a:r>
-              <a:rPr lang="en-US" baseline="0" dirty="0" err="1" smtClean="0"/>
-              <a:t>libros</a:t>
-            </a:r>
-            <a:r>
-              <a:rPr lang="en-US" baseline="0" dirty="0" smtClean="0"/>
-              <a:t> </a:t>
-            </a:r>
-            <a:r>
-              <a:rPr lang="en-US" baseline="0" dirty="0" err="1" smtClean="0"/>
-              <a:t>que</a:t>
-            </a:r>
-            <a:r>
-              <a:rPr lang="en-US" baseline="0" dirty="0" smtClean="0"/>
-              <a:t> </a:t>
-            </a:r>
-            <a:r>
-              <a:rPr lang="en-US" baseline="0" dirty="0" err="1" smtClean="0"/>
-              <a:t>coinciden</a:t>
-            </a:r>
-            <a:r>
-              <a:rPr lang="en-US" baseline="0" dirty="0" smtClean="0"/>
-              <a:t> con el </a:t>
-            </a:r>
-            <a:r>
-              <a:rPr lang="en-US" baseline="0" dirty="0" err="1" smtClean="0"/>
-              <a:t>titulo</a:t>
-            </a:r>
-            <a:r>
-              <a:rPr lang="en-US" baseline="0" dirty="0" smtClean="0"/>
-              <a:t> y el </a:t>
-            </a:r>
-            <a:r>
-              <a:rPr lang="en-US" baseline="0" dirty="0" err="1" smtClean="0"/>
-              <a:t>genero</a:t>
-            </a:r>
-            <a:r>
-              <a:rPr lang="en-US" baseline="0" dirty="0" smtClean="0"/>
-              <a:t> </a:t>
-            </a:r>
-            <a:r>
-              <a:rPr lang="en-US" baseline="0" dirty="0" err="1" smtClean="0"/>
-              <a:t>que</a:t>
-            </a:r>
-            <a:r>
-              <a:rPr lang="en-US" baseline="0" dirty="0" smtClean="0"/>
-              <a:t> </a:t>
-            </a:r>
-            <a:r>
-              <a:rPr lang="en-US" baseline="0" dirty="0" err="1" smtClean="0"/>
-              <a:t>ingresamos</a:t>
-            </a:r>
-            <a:r>
-              <a:rPr lang="en-US" baseline="0" dirty="0" smtClean="0"/>
-              <a:t> </a:t>
-            </a:r>
-            <a:r>
-              <a:rPr lang="en-US" baseline="0" dirty="0" err="1" smtClean="0"/>
-              <a:t>respectivamente</a:t>
-            </a:r>
-            <a:r>
-              <a:rPr lang="en-US" baseline="0" dirty="0" smtClean="0"/>
-              <a:t>.</a:t>
-            </a:r>
-          </a:p>
-          <a:p>
-            <a:endParaRPr lang="es-AR" dirty="0"/>
-          </a:p>
-        </p:txBody>
-      </p:sp>
-      <p:sp>
-        <p:nvSpPr>
-          <p:cNvPr id="4" name="Slide Number Placeholder 3"/>
-          <p:cNvSpPr>
-            <a:spLocks noGrp="1"/>
-          </p:cNvSpPr>
-          <p:nvPr>
-            <p:ph type="sldNum" sz="quarter" idx="10"/>
-          </p:nvPr>
-        </p:nvSpPr>
-        <p:spPr/>
-        <p:txBody>
-          <a:bodyPr/>
-          <a:lstStyle/>
-          <a:p>
-            <a:fld id="{7D61118C-0B68-45A8-8791-420E0DB4DDEA}" type="slidenum">
-              <a:rPr lang="es-AR" smtClean="0"/>
-              <a:t>27</a:t>
-            </a:fld>
-            <a:endParaRPr lang="es-AR"/>
-          </a:p>
-        </p:txBody>
-      </p:sp>
-    </p:spTree>
-    <p:extLst>
-      <p:ext uri="{BB962C8B-B14F-4D97-AF65-F5344CB8AC3E}">
-        <p14:creationId xmlns:p14="http://schemas.microsoft.com/office/powerpoint/2010/main" val="88962205"/>
-      </p:ext>
-    </p:extLst>
-  </p:cSld>
-  <p:clrMapOvr>
-    <a:masterClrMapping/>
-  </p:clrMapOvr>
-</p:notes>
-</file>
-
-<file path=ppt/notesSlides/notesSlide7.xml><?xml version="1.0" encoding="utf-8"?>
-<p:notes xmlns:a="http://schemas.openxmlformats.org/drawingml/2006/main" xmlns:r="http://schemas.openxmlformats.org/officeDocument/2006/relationships" xmlns:p="http://schemas.openxmlformats.org/presentationml/2006/main">
-  <p:cSld>
-    <p:spTree>
-      <p:nvGrpSpPr>
-        <p:cNvPr id="1" name=""/>
-        <p:cNvGrpSpPr/>
-        <p:nvPr/>
-      </p:nvGrpSpPr>
-      <p:grpSpPr>
-        <a:xfrm>
-          <a:off x="0" y="0"/>
-          <a:ext cx="0" cy="0"/>
-          <a:chOff x="0" y="0"/>
-          <a:chExt cx="0" cy="0"/>
-        </a:xfrm>
-      </p:grpSpPr>
-      <p:sp>
-        <p:nvSpPr>
-          <p:cNvPr id="2" name="Slide Image Placeholder 1"/>
-          <p:cNvSpPr>
-            <a:spLocks noGrp="1" noRot="1" noChangeAspect="1"/>
-          </p:cNvSpPr>
-          <p:nvPr>
-            <p:ph type="sldImg"/>
-          </p:nvPr>
-        </p:nvSpPr>
-        <p:spPr/>
-      </p:sp>
-      <p:sp>
-        <p:nvSpPr>
-          <p:cNvPr id="3" name="Notes Placeholder 2"/>
-          <p:cNvSpPr>
-            <a:spLocks noGrp="1"/>
-          </p:cNvSpPr>
-          <p:nvPr>
-            <p:ph type="body" idx="1"/>
-          </p:nvPr>
-        </p:nvSpPr>
-        <p:spPr/>
-        <p:txBody>
-          <a:bodyPr/>
-          <a:lstStyle/>
-          <a:p>
-            <a:r>
-              <a:rPr lang="en-US" dirty="0" err="1" smtClean="0"/>
-              <a:t>Otra</a:t>
-            </a:r>
-            <a:r>
-              <a:rPr lang="en-US" dirty="0" smtClean="0"/>
-              <a:t> </a:t>
-            </a:r>
-            <a:r>
-              <a:rPr lang="en-US" dirty="0" err="1" smtClean="0"/>
-              <a:t>opcion</a:t>
-            </a:r>
-            <a:r>
-              <a:rPr lang="en-US" baseline="0" dirty="0" smtClean="0"/>
-              <a:t> </a:t>
-            </a:r>
-            <a:r>
-              <a:rPr lang="en-US" baseline="0" dirty="0" err="1" smtClean="0"/>
-              <a:t>es</a:t>
-            </a:r>
-            <a:r>
-              <a:rPr lang="en-US" baseline="0" dirty="0" smtClean="0"/>
-              <a:t> </a:t>
-            </a:r>
-            <a:r>
-              <a:rPr lang="en-US" baseline="0" dirty="0" err="1" smtClean="0"/>
-              <a:t>usar</a:t>
-            </a:r>
-            <a:r>
-              <a:rPr lang="en-US" baseline="0" dirty="0" smtClean="0"/>
-              <a:t> </a:t>
-            </a:r>
-            <a:r>
-              <a:rPr lang="en-US" baseline="0" dirty="0" err="1" smtClean="0"/>
-              <a:t>una</a:t>
-            </a:r>
-            <a:r>
-              <a:rPr lang="en-US" baseline="0" dirty="0" smtClean="0"/>
-              <a:t> function </a:t>
-            </a:r>
-            <a:r>
-              <a:rPr lang="en-US" baseline="0" dirty="0" err="1" smtClean="0"/>
-              <a:t>como</a:t>
-            </a:r>
-            <a:r>
-              <a:rPr lang="en-US" baseline="0" dirty="0" smtClean="0"/>
-              <a:t> </a:t>
-            </a:r>
-            <a:r>
-              <a:rPr lang="en-US" baseline="0" dirty="0" err="1" smtClean="0"/>
-              <a:t>criterio</a:t>
-            </a:r>
-            <a:r>
-              <a:rPr lang="en-US" baseline="0" dirty="0" smtClean="0"/>
-              <a:t> de </a:t>
-            </a:r>
-            <a:r>
-              <a:rPr lang="en-US" baseline="0" dirty="0" err="1" smtClean="0"/>
-              <a:t>filtrado</a:t>
-            </a:r>
-            <a:r>
-              <a:rPr lang="en-US" baseline="0" dirty="0" smtClean="0"/>
-              <a:t>. La function </a:t>
-            </a:r>
-            <a:r>
-              <a:rPr lang="en-US" baseline="0" dirty="0" err="1" smtClean="0"/>
-              <a:t>recibe</a:t>
-            </a:r>
-            <a:r>
-              <a:rPr lang="en-US" baseline="0" dirty="0" smtClean="0"/>
-              <a:t> </a:t>
-            </a:r>
-            <a:r>
-              <a:rPr lang="en-US" baseline="0" dirty="0" err="1" smtClean="0"/>
-              <a:t>por</a:t>
-            </a:r>
-            <a:r>
-              <a:rPr lang="en-US" baseline="0" dirty="0" smtClean="0"/>
-              <a:t> </a:t>
-            </a:r>
-            <a:r>
-              <a:rPr lang="en-US" baseline="0" dirty="0" err="1" smtClean="0"/>
-              <a:t>parametro</a:t>
-            </a:r>
-            <a:r>
-              <a:rPr lang="en-US" baseline="0" dirty="0" smtClean="0"/>
-              <a:t> el element </a:t>
-            </a:r>
-            <a:r>
-              <a:rPr lang="en-US" baseline="0" dirty="0" err="1" smtClean="0"/>
-              <a:t>que</a:t>
-            </a:r>
-            <a:r>
-              <a:rPr lang="en-US" baseline="0" dirty="0" smtClean="0"/>
-              <a:t> </a:t>
-            </a:r>
-            <a:r>
-              <a:rPr lang="en-US" baseline="0" dirty="0" err="1" smtClean="0"/>
-              <a:t>esta</a:t>
-            </a:r>
-            <a:r>
-              <a:rPr lang="en-US" baseline="0" dirty="0" smtClean="0"/>
-              <a:t> </a:t>
-            </a:r>
-            <a:r>
-              <a:rPr lang="en-US" baseline="0" dirty="0" err="1" smtClean="0"/>
-              <a:t>iterando</a:t>
-            </a:r>
-            <a:r>
-              <a:rPr lang="en-US" baseline="0" dirty="0" smtClean="0"/>
-              <a:t> y </a:t>
-            </a:r>
-            <a:r>
-              <a:rPr lang="en-US" baseline="0" dirty="0" err="1" smtClean="0"/>
-              <a:t>devuelve</a:t>
-            </a:r>
-            <a:r>
-              <a:rPr lang="en-US" baseline="0" dirty="0" smtClean="0"/>
-              <a:t> true o false </a:t>
-            </a:r>
-            <a:r>
-              <a:rPr lang="en-US" baseline="0" dirty="0" err="1" smtClean="0"/>
-              <a:t>segun</a:t>
-            </a:r>
-            <a:r>
-              <a:rPr lang="en-US" baseline="0" dirty="0" smtClean="0"/>
-              <a:t> se </a:t>
-            </a:r>
-            <a:r>
-              <a:rPr lang="en-US" baseline="0" dirty="0" err="1" smtClean="0"/>
-              <a:t>quiera</a:t>
-            </a:r>
-            <a:r>
-              <a:rPr lang="en-US" baseline="0" dirty="0" smtClean="0"/>
-              <a:t> </a:t>
-            </a:r>
-            <a:r>
-              <a:rPr lang="en-US" baseline="0" dirty="0" err="1" smtClean="0"/>
-              <a:t>conservar</a:t>
-            </a:r>
-            <a:r>
-              <a:rPr lang="en-US" baseline="0" dirty="0" smtClean="0"/>
-              <a:t> el </a:t>
-            </a:r>
-            <a:r>
-              <a:rPr lang="en-US" baseline="0" dirty="0" err="1" smtClean="0"/>
-              <a:t>elemento</a:t>
-            </a:r>
-            <a:r>
-              <a:rPr lang="en-US" baseline="0" dirty="0" smtClean="0"/>
-              <a:t> o no.</a:t>
-            </a:r>
-          </a:p>
-          <a:p>
-            <a:r>
-              <a:rPr lang="en-US" baseline="0" dirty="0" err="1" smtClean="0"/>
-              <a:t>En</a:t>
-            </a:r>
-            <a:r>
-              <a:rPr lang="en-US" baseline="0" dirty="0" smtClean="0"/>
-              <a:t> </a:t>
-            </a:r>
-            <a:r>
-              <a:rPr lang="en-US" baseline="0" dirty="0" err="1" smtClean="0"/>
-              <a:t>este</a:t>
-            </a:r>
-            <a:r>
-              <a:rPr lang="en-US" baseline="0" dirty="0" smtClean="0"/>
-              <a:t> </a:t>
-            </a:r>
-            <a:r>
-              <a:rPr lang="en-US" baseline="0" dirty="0" err="1" smtClean="0"/>
-              <a:t>ejemplo</a:t>
-            </a:r>
-            <a:r>
-              <a:rPr lang="en-US" baseline="0" dirty="0" smtClean="0"/>
-              <a:t> se </a:t>
-            </a:r>
-            <a:r>
-              <a:rPr lang="en-US" baseline="0" dirty="0" err="1" smtClean="0"/>
-              <a:t>filtran</a:t>
-            </a:r>
-            <a:r>
-              <a:rPr lang="en-US" baseline="0" dirty="0" smtClean="0"/>
-              <a:t> </a:t>
-            </a:r>
-            <a:r>
-              <a:rPr lang="en-US" baseline="0" dirty="0" err="1" smtClean="0"/>
-              <a:t>dejando</a:t>
-            </a:r>
-            <a:r>
-              <a:rPr lang="en-US" baseline="0" dirty="0" smtClean="0"/>
-              <a:t> solo </a:t>
-            </a:r>
-            <a:r>
-              <a:rPr lang="en-US" baseline="0" dirty="0" err="1" smtClean="0"/>
-              <a:t>aquellos</a:t>
-            </a:r>
-            <a:r>
-              <a:rPr lang="en-US" baseline="0" dirty="0" smtClean="0"/>
-              <a:t> </a:t>
-            </a:r>
-            <a:r>
-              <a:rPr lang="en-US" baseline="0" dirty="0" err="1" smtClean="0"/>
-              <a:t>libros</a:t>
-            </a:r>
-            <a:r>
-              <a:rPr lang="en-US" baseline="0" dirty="0" smtClean="0"/>
-              <a:t> </a:t>
-            </a:r>
-            <a:r>
-              <a:rPr lang="en-US" baseline="0" dirty="0" err="1" smtClean="0"/>
-              <a:t>que</a:t>
-            </a:r>
-            <a:r>
-              <a:rPr lang="en-US" baseline="0" dirty="0" smtClean="0"/>
-              <a:t> </a:t>
-            </a:r>
-            <a:r>
-              <a:rPr lang="en-US" baseline="0" dirty="0" err="1" smtClean="0"/>
-              <a:t>tienen</a:t>
-            </a:r>
-            <a:r>
-              <a:rPr lang="en-US" baseline="0" dirty="0" smtClean="0"/>
-              <a:t> </a:t>
-            </a:r>
-            <a:r>
-              <a:rPr lang="en-US" baseline="0" dirty="0" err="1" smtClean="0"/>
-              <a:t>definida</a:t>
-            </a:r>
-            <a:r>
-              <a:rPr lang="en-US" baseline="0" dirty="0" smtClean="0"/>
-              <a:t> la </a:t>
-            </a:r>
-            <a:r>
-              <a:rPr lang="en-US" baseline="0" dirty="0" err="1" smtClean="0"/>
-              <a:t>propiedad</a:t>
-            </a:r>
-            <a:r>
-              <a:rPr lang="en-US" baseline="0" dirty="0" smtClean="0"/>
-              <a:t> </a:t>
-            </a:r>
-            <a:r>
-              <a:rPr lang="en-US" baseline="0" dirty="0" err="1" smtClean="0"/>
-              <a:t>genero</a:t>
-            </a:r>
-            <a:r>
-              <a:rPr lang="en-US" baseline="0" dirty="0" smtClean="0"/>
-              <a:t>.</a:t>
-            </a:r>
-            <a:endParaRPr lang="es-AR" dirty="0" smtClean="0"/>
-          </a:p>
-          <a:p>
-            <a:endParaRPr lang="es-AR" dirty="0"/>
-          </a:p>
-        </p:txBody>
-      </p:sp>
-      <p:sp>
-        <p:nvSpPr>
-          <p:cNvPr id="4" name="Slide Number Placeholder 3"/>
-          <p:cNvSpPr>
-            <a:spLocks noGrp="1"/>
-          </p:cNvSpPr>
-          <p:nvPr>
-            <p:ph type="sldNum" sz="quarter" idx="10"/>
-          </p:nvPr>
-        </p:nvSpPr>
-        <p:spPr/>
-        <p:txBody>
-          <a:bodyPr/>
-          <a:lstStyle/>
-          <a:p>
-            <a:fld id="{7D61118C-0B68-45A8-8791-420E0DB4DDEA}" type="slidenum">
-              <a:rPr lang="es-AR" smtClean="0"/>
-              <a:t>28</a:t>
-            </a:fld>
-            <a:endParaRPr lang="es-AR"/>
-          </a:p>
-        </p:txBody>
-      </p:sp>
-    </p:spTree>
-    <p:extLst>
-      <p:ext uri="{BB962C8B-B14F-4D97-AF65-F5344CB8AC3E}">
-        <p14:creationId xmlns:p14="http://schemas.microsoft.com/office/powerpoint/2010/main" val="2767117684"/>
-      </p:ext>
-    </p:extLst>
-  </p:cSld>
-  <p:clrMapOvr>
-    <a:masterClrMapping/>
-  </p:clrMapOvr>
-</p:notes>
-</file>
-
-<file path=ppt/notesSlides/notesSlide8.xml><?xml version="1.0" encoding="utf-8"?>
-<p:notes xmlns:a="http://schemas.openxmlformats.org/drawingml/2006/main" xmlns:r="http://schemas.openxmlformats.org/officeDocument/2006/relationships" xmlns:p="http://schemas.openxmlformats.org/presentationml/2006/main">
-  <p:cSld>
-    <p:spTree>
-      <p:nvGrpSpPr>
-        <p:cNvPr id="1" name=""/>
-        <p:cNvGrpSpPr/>
-        <p:nvPr/>
-      </p:nvGrpSpPr>
-      <p:grpSpPr>
-        <a:xfrm>
-          <a:off x="0" y="0"/>
-          <a:ext cx="0" cy="0"/>
-          <a:chOff x="0" y="0"/>
-          <a:chExt cx="0" cy="0"/>
-        </a:xfrm>
-      </p:grpSpPr>
-      <p:sp>
-        <p:nvSpPr>
-          <p:cNvPr id="2" name="Slide Image Placeholder 1"/>
-          <p:cNvSpPr>
-            <a:spLocks noGrp="1" noRot="1" noChangeAspect="1"/>
-          </p:cNvSpPr>
-          <p:nvPr>
-            <p:ph type="sldImg"/>
-          </p:nvPr>
-        </p:nvSpPr>
-        <p:spPr/>
-      </p:sp>
-      <p:sp>
-        <p:nvSpPr>
-          <p:cNvPr id="3" name="Notes Placeholder 2"/>
-          <p:cNvSpPr>
-            <a:spLocks noGrp="1"/>
-          </p:cNvSpPr>
-          <p:nvPr>
-            <p:ph type="body" idx="1"/>
-          </p:nvPr>
-        </p:nvSpPr>
-        <p:spPr/>
-        <p:txBody>
-          <a:bodyPr/>
-          <a:lstStyle/>
-          <a:p>
-            <a:r>
-              <a:rPr lang="en-US" dirty="0" err="1" smtClean="0"/>
-              <a:t>Otro</a:t>
-            </a:r>
-            <a:r>
-              <a:rPr lang="en-US" dirty="0" smtClean="0"/>
-              <a:t> </a:t>
-            </a:r>
-            <a:r>
-              <a:rPr lang="en-US" dirty="0" err="1" smtClean="0"/>
-              <a:t>filtro</a:t>
-            </a:r>
-            <a:r>
-              <a:rPr lang="en-US" dirty="0" smtClean="0"/>
-              <a:t> </a:t>
-            </a:r>
-            <a:r>
-              <a:rPr lang="en-US" dirty="0" err="1" smtClean="0"/>
-              <a:t>muy</a:t>
-            </a:r>
-            <a:r>
-              <a:rPr lang="en-US" dirty="0" smtClean="0"/>
-              <a:t> </a:t>
-            </a:r>
-            <a:r>
-              <a:rPr lang="en-US" dirty="0" err="1" smtClean="0"/>
-              <a:t>usado</a:t>
-            </a:r>
-            <a:r>
-              <a:rPr lang="en-US" dirty="0" smtClean="0"/>
-              <a:t> </a:t>
-            </a:r>
-            <a:r>
-              <a:rPr lang="en-US" dirty="0" err="1" smtClean="0"/>
-              <a:t>es</a:t>
-            </a:r>
-            <a:r>
-              <a:rPr lang="en-US" dirty="0" smtClean="0"/>
-              <a:t> el de </a:t>
-            </a:r>
-            <a:r>
-              <a:rPr lang="en-US" dirty="0" err="1" smtClean="0"/>
-              <a:t>orderBy</a:t>
-            </a:r>
-            <a:r>
-              <a:rPr lang="en-US" dirty="0" smtClean="0"/>
-              <a:t>.</a:t>
-            </a:r>
-          </a:p>
-          <a:p>
-            <a:r>
-              <a:rPr lang="en-US" dirty="0" err="1" smtClean="0"/>
-              <a:t>Ordena</a:t>
-            </a:r>
-            <a:r>
-              <a:rPr lang="en-US" dirty="0" smtClean="0"/>
-              <a:t> los </a:t>
-            </a:r>
-            <a:r>
-              <a:rPr lang="en-US" dirty="0" err="1" smtClean="0"/>
-              <a:t>valores</a:t>
-            </a:r>
-            <a:r>
-              <a:rPr lang="en-US" dirty="0" smtClean="0"/>
-              <a:t> de la </a:t>
-            </a:r>
-            <a:r>
-              <a:rPr lang="en-US" dirty="0" err="1" smtClean="0"/>
-              <a:t>coleccion</a:t>
-            </a:r>
-            <a:r>
-              <a:rPr lang="en-US" dirty="0" smtClean="0"/>
-              <a:t>, </a:t>
-            </a:r>
-            <a:r>
-              <a:rPr lang="en-US" dirty="0" err="1" smtClean="0"/>
-              <a:t>en</a:t>
-            </a:r>
-            <a:r>
-              <a:rPr lang="en-US" dirty="0" smtClean="0"/>
-              <a:t> base</a:t>
-            </a:r>
-            <a:r>
-              <a:rPr lang="en-US" baseline="0" dirty="0" smtClean="0"/>
-              <a:t> a la </a:t>
-            </a:r>
-            <a:r>
-              <a:rPr lang="en-US" baseline="0" dirty="0" err="1" smtClean="0"/>
-              <a:t>propiedad</a:t>
-            </a:r>
-            <a:r>
-              <a:rPr lang="en-US" baseline="0" dirty="0" smtClean="0"/>
-              <a:t> </a:t>
-            </a:r>
-            <a:r>
-              <a:rPr lang="en-US" baseline="0" dirty="0" err="1" smtClean="0"/>
-              <a:t>que</a:t>
-            </a:r>
-            <a:r>
-              <a:rPr lang="en-US" baseline="0" dirty="0" smtClean="0"/>
-              <a:t> se le </a:t>
-            </a:r>
-            <a:r>
-              <a:rPr lang="en-US" baseline="0" dirty="0" err="1" smtClean="0"/>
-              <a:t>pasa</a:t>
-            </a:r>
-            <a:r>
-              <a:rPr lang="en-US" baseline="0" dirty="0" smtClean="0"/>
-              <a:t> </a:t>
-            </a:r>
-            <a:r>
-              <a:rPr lang="en-US" baseline="0" dirty="0" err="1" smtClean="0"/>
-              <a:t>por</a:t>
-            </a:r>
-            <a:r>
-              <a:rPr lang="en-US" baseline="0" dirty="0" smtClean="0"/>
-              <a:t> </a:t>
-            </a:r>
-            <a:r>
-              <a:rPr lang="en-US" baseline="0" dirty="0" err="1" smtClean="0"/>
-              <a:t>parametro</a:t>
-            </a:r>
-            <a:r>
-              <a:rPr lang="en-US" baseline="0" dirty="0" smtClean="0"/>
-              <a:t> y el </a:t>
-            </a:r>
-            <a:r>
-              <a:rPr lang="en-US" baseline="0" dirty="0" err="1" smtClean="0"/>
-              <a:t>orden</a:t>
-            </a:r>
-            <a:r>
-              <a:rPr lang="en-US" baseline="0" dirty="0" smtClean="0"/>
-              <a:t>: true para </a:t>
-            </a:r>
-            <a:r>
-              <a:rPr lang="en-US" baseline="0" dirty="0" err="1" smtClean="0"/>
-              <a:t>ascendente</a:t>
-            </a:r>
-            <a:r>
-              <a:rPr lang="en-US" baseline="0" dirty="0" smtClean="0"/>
-              <a:t>, false para </a:t>
-            </a:r>
-            <a:r>
-              <a:rPr lang="en-US" baseline="0" dirty="0" err="1" smtClean="0"/>
-              <a:t>descendente</a:t>
-            </a:r>
-            <a:r>
-              <a:rPr lang="en-US" baseline="0" dirty="0" smtClean="0"/>
-              <a:t>.</a:t>
-            </a:r>
-            <a:endParaRPr lang="es-AR" dirty="0" smtClean="0"/>
-          </a:p>
-          <a:p>
-            <a:endParaRPr lang="es-AR" dirty="0"/>
-          </a:p>
-        </p:txBody>
-      </p:sp>
-      <p:sp>
-        <p:nvSpPr>
-          <p:cNvPr id="4" name="Slide Number Placeholder 3"/>
-          <p:cNvSpPr>
-            <a:spLocks noGrp="1"/>
-          </p:cNvSpPr>
-          <p:nvPr>
-            <p:ph type="sldNum" sz="quarter" idx="10"/>
-          </p:nvPr>
-        </p:nvSpPr>
-        <p:spPr/>
-        <p:txBody>
-          <a:bodyPr/>
-          <a:lstStyle/>
-          <a:p>
-            <a:fld id="{7D61118C-0B68-45A8-8791-420E0DB4DDEA}" type="slidenum">
-              <a:rPr lang="es-AR" smtClean="0"/>
-              <a:t>29</a:t>
-            </a:fld>
-            <a:endParaRPr lang="es-AR"/>
-          </a:p>
-        </p:txBody>
-      </p:sp>
-    </p:spTree>
-    <p:extLst>
-      <p:ext uri="{BB962C8B-B14F-4D97-AF65-F5344CB8AC3E}">
-        <p14:creationId xmlns:p14="http://schemas.microsoft.com/office/powerpoint/2010/main" val="2543480888"/>
-      </p:ext>
-    </p:extLst>
-  </p:cSld>
-  <p:clrMapOvr>
-    <a:masterClrMapping/>
-  </p:clrMapOvr>
-</p:notes>
-</file>
-
-<file path=ppt/notesSlides/notesSlide9.xml><?xml version="1.0" encoding="utf-8"?>
-<p:notes xmlns:a="http://schemas.openxmlformats.org/drawingml/2006/main" xmlns:r="http://schemas.openxmlformats.org/officeDocument/2006/relationships" xmlns:p="http://schemas.openxmlformats.org/presentationml/2006/main">
-  <p:cSld>
-    <p:spTree>
-      <p:nvGrpSpPr>
-        <p:cNvPr id="1" name=""/>
-        <p:cNvGrpSpPr/>
-        <p:nvPr/>
-      </p:nvGrpSpPr>
-      <p:grpSpPr>
-        <a:xfrm>
-          <a:off x="0" y="0"/>
-          <a:ext cx="0" cy="0"/>
-          <a:chOff x="0" y="0"/>
-          <a:chExt cx="0" cy="0"/>
-        </a:xfrm>
-      </p:grpSpPr>
-      <p:sp>
-        <p:nvSpPr>
-          <p:cNvPr id="2" name="Slide Image Placeholder 1"/>
-          <p:cNvSpPr>
-            <a:spLocks noGrp="1" noRot="1" noChangeAspect="1"/>
-          </p:cNvSpPr>
-          <p:nvPr>
-            <p:ph type="sldImg"/>
-          </p:nvPr>
-        </p:nvSpPr>
-        <p:spPr/>
-      </p:sp>
-      <p:sp>
-        <p:nvSpPr>
-          <p:cNvPr id="3" name="Notes Placeholder 2"/>
-          <p:cNvSpPr>
-            <a:spLocks noGrp="1"/>
-          </p:cNvSpPr>
-          <p:nvPr>
-            <p:ph type="body" idx="1"/>
-          </p:nvPr>
-        </p:nvSpPr>
-        <p:spPr/>
-        <p:txBody>
-          <a:bodyPr/>
-          <a:lstStyle/>
-          <a:p>
-            <a:pPr marL="0" marR="0" indent="0" algn="l" defTabSz="914400" rtl="0" eaLnBrk="1" fontAlgn="auto" latinLnBrk="0" hangingPunct="1">
-              <a:lnSpc>
-                <a:spcPct val="100000"/>
-              </a:lnSpc>
-              <a:spcBef>
-                <a:spcPts val="0"/>
-              </a:spcBef>
-              <a:spcAft>
-                <a:spcPts val="0"/>
-              </a:spcAft>
-              <a:buClrTx/>
-              <a:buSzTx/>
-              <a:buFontTx/>
-              <a:buNone/>
-              <a:tabLst/>
-              <a:defRPr/>
-            </a:pPr>
-            <a:r>
-              <a:rPr lang="en-US" dirty="0" err="1" smtClean="0"/>
-              <a:t>Aplicado</a:t>
-            </a:r>
-            <a:r>
-              <a:rPr lang="en-US" dirty="0" smtClean="0"/>
-              <a:t> a </a:t>
-            </a:r>
-            <a:r>
-              <a:rPr lang="en-US" dirty="0" err="1" smtClean="0"/>
-              <a:t>nuestro</a:t>
-            </a:r>
-            <a:r>
-              <a:rPr lang="en-US" dirty="0" smtClean="0"/>
-              <a:t> </a:t>
-            </a:r>
-            <a:r>
-              <a:rPr lang="en-US" dirty="0" err="1" smtClean="0"/>
-              <a:t>ejemplo</a:t>
-            </a:r>
-            <a:r>
-              <a:rPr lang="en-US" dirty="0" smtClean="0"/>
-              <a:t> </a:t>
-            </a:r>
-            <a:r>
-              <a:rPr lang="en-US" dirty="0" err="1" smtClean="0"/>
-              <a:t>vemos</a:t>
-            </a:r>
-            <a:r>
-              <a:rPr lang="en-US" dirty="0" smtClean="0"/>
-              <a:t> </a:t>
-            </a:r>
-            <a:r>
-              <a:rPr lang="en-US" dirty="0" err="1" smtClean="0"/>
-              <a:t>que</a:t>
-            </a:r>
-            <a:r>
-              <a:rPr lang="en-US" dirty="0" smtClean="0"/>
-              <a:t> </a:t>
-            </a:r>
-            <a:r>
-              <a:rPr lang="en-US" dirty="0" err="1" smtClean="0"/>
-              <a:t>ordenamos</a:t>
-            </a:r>
-            <a:r>
-              <a:rPr lang="en-US" dirty="0" smtClean="0"/>
-              <a:t> los</a:t>
-            </a:r>
-            <a:r>
-              <a:rPr lang="en-US" baseline="0" dirty="0" smtClean="0"/>
-              <a:t> </a:t>
-            </a:r>
-            <a:r>
-              <a:rPr lang="en-US" baseline="0" dirty="0" err="1" smtClean="0"/>
-              <a:t>libros</a:t>
-            </a:r>
-            <a:r>
-              <a:rPr lang="en-US" baseline="0" dirty="0" smtClean="0"/>
-              <a:t> </a:t>
-            </a:r>
-            <a:r>
-              <a:rPr lang="en-US" baseline="0" dirty="0" err="1" smtClean="0"/>
-              <a:t>en</a:t>
-            </a:r>
-            <a:r>
-              <a:rPr lang="en-US" baseline="0" dirty="0" smtClean="0"/>
-              <a:t> base a la </a:t>
-            </a:r>
-            <a:r>
-              <a:rPr lang="en-US" baseline="0" dirty="0" err="1" smtClean="0"/>
-              <a:t>propiedad</a:t>
-            </a:r>
-            <a:r>
-              <a:rPr lang="en-US" baseline="0" dirty="0" smtClean="0"/>
-              <a:t> </a:t>
-            </a:r>
-            <a:r>
-              <a:rPr lang="en-US" baseline="0" dirty="0" err="1" smtClean="0"/>
-              <a:t>que</a:t>
-            </a:r>
-            <a:r>
-              <a:rPr lang="en-US" baseline="0" dirty="0" smtClean="0"/>
-              <a:t> </a:t>
-            </a:r>
-            <a:r>
-              <a:rPr lang="en-US" baseline="0" dirty="0" err="1" smtClean="0"/>
-              <a:t>elegimos</a:t>
-            </a:r>
-            <a:r>
-              <a:rPr lang="en-US" baseline="0" dirty="0" smtClean="0"/>
-              <a:t> </a:t>
-            </a:r>
-            <a:r>
-              <a:rPr lang="en-US" baseline="0" dirty="0" err="1" smtClean="0"/>
-              <a:t>en</a:t>
-            </a:r>
-            <a:r>
-              <a:rPr lang="en-US" baseline="0" dirty="0" smtClean="0"/>
-              <a:t> el combo y la </a:t>
-            </a:r>
-            <a:r>
-              <a:rPr lang="en-US" baseline="0" dirty="0" err="1" smtClean="0"/>
-              <a:t>direccion</a:t>
-            </a:r>
-            <a:r>
-              <a:rPr lang="en-US" baseline="0" dirty="0" smtClean="0"/>
-              <a:t> </a:t>
-            </a:r>
-            <a:r>
-              <a:rPr lang="en-US" baseline="0" dirty="0" err="1" smtClean="0"/>
-              <a:t>segun</a:t>
-            </a:r>
-            <a:r>
-              <a:rPr lang="en-US" baseline="0" dirty="0" smtClean="0"/>
-              <a:t> el valor del checkbox</a:t>
-            </a:r>
-            <a:endParaRPr lang="es-AR" dirty="0" smtClean="0"/>
-          </a:p>
-          <a:p>
-            <a:endParaRPr lang="es-AR" dirty="0"/>
-          </a:p>
-        </p:txBody>
-      </p:sp>
-      <p:sp>
-        <p:nvSpPr>
-          <p:cNvPr id="4" name="Slide Number Placeholder 3"/>
-          <p:cNvSpPr>
-            <a:spLocks noGrp="1"/>
-          </p:cNvSpPr>
-          <p:nvPr>
-            <p:ph type="sldNum" sz="quarter" idx="10"/>
-          </p:nvPr>
-        </p:nvSpPr>
-        <p:spPr/>
-        <p:txBody>
-          <a:bodyPr/>
-          <a:lstStyle/>
-          <a:p>
-            <a:fld id="{7D61118C-0B68-45A8-8791-420E0DB4DDEA}" type="slidenum">
-              <a:rPr lang="es-AR" smtClean="0"/>
-              <a:t>30</a:t>
-            </a:fld>
-            <a:endParaRPr lang="es-AR"/>
-          </a:p>
-        </p:txBody>
-      </p:sp>
-    </p:spTree>
-    <p:extLst>
-      <p:ext uri="{BB962C8B-B14F-4D97-AF65-F5344CB8AC3E}">
-        <p14:creationId xmlns:p14="http://schemas.microsoft.com/office/powerpoint/2010/main" val="1072001475"/>
+        <p14:creationId xmlns:p14="http://schemas.microsoft.com/office/powerpoint/2010/main" val="221556377"/>
       </p:ext>
     </p:extLst>
   </p:cSld>
@@ -17981,7 +13923,7 @@
     </p:spTree>
     <p:extLst>
       <p:ext uri="{BB962C8B-B14F-4D97-AF65-F5344CB8AC3E}">
-        <p14:creationId xmlns:p14="http://schemas.microsoft.com/office/powerpoint/2010/main" val="2638570372"/>
+        <p14:creationId xmlns:p14="http://schemas.microsoft.com/office/powerpoint/2010/main" val="95994769"/>
       </p:ext>
     </p:extLst>
   </p:cSld>
@@ -18509,7 +14451,7 @@
     </p:spTree>
     <p:extLst>
       <p:ext uri="{BB962C8B-B14F-4D97-AF65-F5344CB8AC3E}">
-        <p14:creationId xmlns:p14="http://schemas.microsoft.com/office/powerpoint/2010/main" val="3399314732"/>
+        <p14:creationId xmlns:p14="http://schemas.microsoft.com/office/powerpoint/2010/main" val="39448732"/>
       </p:ext>
     </p:extLst>
   </p:cSld>
@@ -19242,7 +15184,7 @@
     </p:spTree>
     <p:extLst>
       <p:ext uri="{BB962C8B-B14F-4D97-AF65-F5344CB8AC3E}">
-        <p14:creationId xmlns:p14="http://schemas.microsoft.com/office/powerpoint/2010/main" val="1695704000"/>
+        <p14:creationId xmlns:p14="http://schemas.microsoft.com/office/powerpoint/2010/main" val="2693489743"/>
       </p:ext>
     </p:extLst>
   </p:cSld>
@@ -19836,7 +15778,7 @@
     </p:spTree>
     <p:extLst>
       <p:ext uri="{BB962C8B-B14F-4D97-AF65-F5344CB8AC3E}">
-        <p14:creationId xmlns:p14="http://schemas.microsoft.com/office/powerpoint/2010/main" val="2619516206"/>
+        <p14:creationId xmlns:p14="http://schemas.microsoft.com/office/powerpoint/2010/main" val="2872880730"/>
       </p:ext>
     </p:extLst>
   </p:cSld>
@@ -20472,7 +16414,7 @@
     </p:spTree>
     <p:extLst>
       <p:ext uri="{BB962C8B-B14F-4D97-AF65-F5344CB8AC3E}">
-        <p14:creationId xmlns:p14="http://schemas.microsoft.com/office/powerpoint/2010/main" val="3426826741"/>
+        <p14:creationId xmlns:p14="http://schemas.microsoft.com/office/powerpoint/2010/main" val="2695993124"/>
       </p:ext>
     </p:extLst>
   </p:cSld>
@@ -20553,7 +16495,7 @@
     </p:spTree>
     <p:extLst>
       <p:ext uri="{BB962C8B-B14F-4D97-AF65-F5344CB8AC3E}">
-        <p14:creationId xmlns:p14="http://schemas.microsoft.com/office/powerpoint/2010/main" val="1097333673"/>
+        <p14:creationId xmlns:p14="http://schemas.microsoft.com/office/powerpoint/2010/main" val="2549855091"/>
       </p:ext>
     </p:extLst>
   </p:cSld>
@@ -21353,7 +17295,7 @@
     </p:spTree>
     <p:extLst>
       <p:ext uri="{BB962C8B-B14F-4D97-AF65-F5344CB8AC3E}">
-        <p14:creationId xmlns:p14="http://schemas.microsoft.com/office/powerpoint/2010/main" val="1618323679"/>
+        <p14:creationId xmlns:p14="http://schemas.microsoft.com/office/powerpoint/2010/main" val="3161018784"/>
       </p:ext>
     </p:extLst>
   </p:cSld>
@@ -21698,7 +17640,7 @@
     </p:spTree>
     <p:extLst>
       <p:ext uri="{BB962C8B-B14F-4D97-AF65-F5344CB8AC3E}">
-        <p14:creationId xmlns:p14="http://schemas.microsoft.com/office/powerpoint/2010/main" val="3347511168"/>
+        <p14:creationId xmlns:p14="http://schemas.microsoft.com/office/powerpoint/2010/main" val="1892298591"/>
       </p:ext>
     </p:extLst>
   </p:cSld>
@@ -21985,7 +17927,7 @@
           <a:lstStyle/>
           <a:p>
             <a:r>
-              <a:rPr lang="en-US" dirty="0" err="1">
+              <a:rPr lang="en-US" dirty="0">
                 <a:solidFill>
                   <a:srgbClr val="0070C0"/>
                 </a:solidFill>
@@ -22081,7 +18023,7 @@
           </a:p>
           <a:p>
             <a:r>
-              <a:rPr lang="en-US" dirty="0" err="1">
+              <a:rPr lang="en-US" dirty="0">
                 <a:solidFill>
                   <a:srgbClr val="0070C0"/>
                 </a:solidFill>
@@ -22158,7 +18100,7 @@
     </p:spTree>
     <p:extLst>
       <p:ext uri="{BB962C8B-B14F-4D97-AF65-F5344CB8AC3E}">
-        <p14:creationId xmlns:p14="http://schemas.microsoft.com/office/powerpoint/2010/main" val="2512918592"/>
+        <p14:creationId xmlns:p14="http://schemas.microsoft.com/office/powerpoint/2010/main" val="563847963"/>
       </p:ext>
     </p:extLst>
   </p:cSld>
@@ -22215,7 +18157,7 @@
     </p:spTree>
     <p:extLst>
       <p:ext uri="{BB962C8B-B14F-4D97-AF65-F5344CB8AC3E}">
-        <p14:creationId xmlns:p14="http://schemas.microsoft.com/office/powerpoint/2010/main" val="3731083186"/>
+        <p14:creationId xmlns:p14="http://schemas.microsoft.com/office/powerpoint/2010/main" val="2549415191"/>
       </p:ext>
     </p:extLst>
   </p:cSld>
@@ -22613,7 +18555,7 @@
     </p:spTree>
     <p:extLst>
       <p:ext uri="{BB962C8B-B14F-4D97-AF65-F5344CB8AC3E}">
-        <p14:creationId xmlns:p14="http://schemas.microsoft.com/office/powerpoint/2010/main" val="982087055"/>
+        <p14:creationId xmlns:p14="http://schemas.microsoft.com/office/powerpoint/2010/main" val="32454100"/>
       </p:ext>
     </p:extLst>
   </p:cSld>
@@ -23371,7 +19313,7 @@
     </p:spTree>
     <p:extLst>
       <p:ext uri="{BB962C8B-B14F-4D97-AF65-F5344CB8AC3E}">
-        <p14:creationId xmlns:p14="http://schemas.microsoft.com/office/powerpoint/2010/main" val="2914980463"/>
+        <p14:creationId xmlns:p14="http://schemas.microsoft.com/office/powerpoint/2010/main" val="4141931813"/>
       </p:ext>
     </p:extLst>
   </p:cSld>
@@ -23918,24 +19860,14 @@
               <a:t>    </a:t>
             </a:r>
             <a:r>
-              <a:rPr lang="en-US" sz="1600" dirty="0" err="1">
+              <a:rPr lang="en-US" sz="1600" dirty="0">
                 <a:solidFill>
                   <a:srgbClr val="002060"/>
                 </a:solidFill>
                 <a:latin typeface="Courier New" panose="02070309020205020404" pitchFamily="49" charset="0"/>
                 <a:cs typeface="Courier New" panose="02070309020205020404" pitchFamily="49" charset="0"/>
               </a:rPr>
-              <a:t>var</a:t>
-            </a:r>
-            <a:r>
-              <a:rPr lang="en-US" sz="1600" dirty="0">
-                <a:solidFill>
-                  <a:srgbClr val="002060"/>
-                </a:solidFill>
-                <a:latin typeface="Courier New" panose="02070309020205020404" pitchFamily="49" charset="0"/>
-                <a:cs typeface="Courier New" panose="02070309020205020404" pitchFamily="49" charset="0"/>
-              </a:rPr>
-              <a:t> </a:t>
+              <a:t>var </a:t>
             </a:r>
             <a:r>
               <a:rPr lang="en-US" sz="1600" dirty="0" err="1">
@@ -24327,7 +20259,7 @@
     </p:spTree>
     <p:extLst>
       <p:ext uri="{BB962C8B-B14F-4D97-AF65-F5344CB8AC3E}">
-        <p14:creationId xmlns:p14="http://schemas.microsoft.com/office/powerpoint/2010/main" val="650986107"/>
+        <p14:creationId xmlns:p14="http://schemas.microsoft.com/office/powerpoint/2010/main" val="4223829340"/>
       </p:ext>
     </p:extLst>
   </p:cSld>
@@ -24390,7 +20322,7 @@
     </p:spTree>
     <p:extLst>
       <p:ext uri="{BB962C8B-B14F-4D97-AF65-F5344CB8AC3E}">
-        <p14:creationId xmlns:p14="http://schemas.microsoft.com/office/powerpoint/2010/main" val="2581397326"/>
+        <p14:creationId xmlns:p14="http://schemas.microsoft.com/office/powerpoint/2010/main" val="729234385"/>
       </p:ext>
     </p:extLst>
   </p:cSld>
@@ -25026,7 +20958,7 @@
     </p:spTree>
     <p:extLst>
       <p:ext uri="{BB962C8B-B14F-4D97-AF65-F5344CB8AC3E}">
-        <p14:creationId xmlns:p14="http://schemas.microsoft.com/office/powerpoint/2010/main" val="1223624324"/>
+        <p14:creationId xmlns:p14="http://schemas.microsoft.com/office/powerpoint/2010/main" val="4189456363"/>
       </p:ext>
     </p:extLst>
   </p:cSld>
@@ -25317,7 +21249,7 @@
           <p:nvPr/>
         </p:nvPicPr>
         <p:blipFill>
-          <a:blip r:embed="rId3">
+          <a:blip r:embed="rId2">
             <a:extLst>
               <a:ext uri="{28A0092B-C50C-407E-A947-70E740481C1C}">
                 <a14:useLocalDpi xmlns:a14="http://schemas.microsoft.com/office/drawing/2010/main" val="0"/>
@@ -25341,7 +21273,7 @@
     </p:spTree>
     <p:extLst>
       <p:ext uri="{BB962C8B-B14F-4D97-AF65-F5344CB8AC3E}">
-        <p14:creationId xmlns:p14="http://schemas.microsoft.com/office/powerpoint/2010/main" val="3572516214"/>
+        <p14:creationId xmlns:p14="http://schemas.microsoft.com/office/powerpoint/2010/main" val="887189629"/>
       </p:ext>
     </p:extLst>
   </p:cSld>
@@ -25913,7 +21845,7 @@
           <p:nvPr/>
         </p:nvPicPr>
         <p:blipFill>
-          <a:blip r:embed="rId3">
+          <a:blip r:embed="rId2">
             <a:extLst>
               <a:ext uri="{28A0092B-C50C-407E-A947-70E740481C1C}">
                 <a14:useLocalDpi xmlns:a14="http://schemas.microsoft.com/office/drawing/2010/main" val="0"/>
@@ -26210,7 +22142,7 @@
     </p:spTree>
     <p:extLst>
       <p:ext uri="{BB962C8B-B14F-4D97-AF65-F5344CB8AC3E}">
-        <p14:creationId xmlns:p14="http://schemas.microsoft.com/office/powerpoint/2010/main" val="1367921968"/>
+        <p14:creationId xmlns:p14="http://schemas.microsoft.com/office/powerpoint/2010/main" val="2298598611"/>
       </p:ext>
     </p:extLst>
   </p:cSld>
@@ -27927,15 +23859,7 @@
                   <a:schemeClr val="tx1"/>
                 </a:solidFill>
               </a:rPr>
-              <a:t>Los servicios de Angular son objetos sustituibles que están conectados entre sí mediante la inyección de dependencias (DI). Se pueden usar los servicios para organizar y compartir código a través de su aplicación</a:t>
-            </a:r>
-            <a:r>
-              <a:rPr lang="es-AR" sz="1350" dirty="0">
-                <a:solidFill>
-                  <a:schemeClr val="tx1"/>
-                </a:solidFill>
-              </a:rPr>
-              <a:t>.</a:t>
+              <a:t>Los servicios de Angular son objetos sustituibles que están conectados entre sí mediante la inyección de dependencias (DI). Se pueden usar los servicios para organizar y compartir código a través de su aplicación.</a:t>
             </a:r>
             <a:endParaRPr lang="en-US" sz="1350" dirty="0">
               <a:solidFill>
@@ -28317,15 +24241,7 @@
                   <a:schemeClr val="tx1"/>
                 </a:solidFill>
               </a:rPr>
-              <a:t> la service factory</a:t>
-            </a:r>
-            <a:r>
-              <a:rPr lang="en-US" sz="1350" dirty="0">
-                <a:solidFill>
-                  <a:schemeClr val="tx1"/>
-                </a:solidFill>
-              </a:rPr>
-              <a:t>.</a:t>
+              <a:t> la service factory.</a:t>
             </a:r>
             <a:endParaRPr lang="es-ES_tradnl" dirty="0"/>
           </a:p>
@@ -30853,10 +26769,6 @@
               </a:rPr>
               <a:t>);</a:t>
             </a:r>
-            <a:endParaRPr lang="es-AR" sz="1050" dirty="0">
-              <a:latin typeface="Courier New" panose="02070309020205020404" pitchFamily="49" charset="0"/>
-              <a:cs typeface="Courier New" panose="02070309020205020404" pitchFamily="49" charset="0"/>
-            </a:endParaRPr>
           </a:p>
         </p:txBody>
       </p:sp>
@@ -32750,11 +28662,7 @@
             </a:r>
             <a:r>
               <a:rPr lang="en-US" sz="1500" dirty="0"/>
-              <a:t> movie = </a:t>
-            </a:r>
-            <a:r>
-              <a:rPr lang="en-US" sz="1500" dirty="0"/>
-              <a:t>{title: </a:t>
+              <a:t> movie = {title: </a:t>
             </a:r>
             <a:r>
               <a:rPr lang="en-US" sz="1500" dirty="0">
@@ -33705,11 +29613,7 @@
             </a:r>
             <a:r>
               <a:rPr lang="es-AR" sz="1350" dirty="0"/>
-              <a:t> </a:t>
-            </a:r>
-            <a:r>
-              <a:rPr lang="es-AR" sz="1350" dirty="0"/>
-              <a:t>es una plataforma basada en el </a:t>
+              <a:t> es una plataforma basada en el </a:t>
             </a:r>
             <a:r>
               <a:rPr lang="es-AR" sz="1350" dirty="0" err="1"/>
@@ -33856,13 +29760,8 @@
             </a:r>
             <a:r>
               <a:rPr lang="es-AR" sz="1350" dirty="0"/>
-              <a:t> manager :</a:t>
-            </a:r>
-            <a:r>
-              <a:rPr lang="es-AR" sz="1350" dirty="0"/>
-              <a:t>O</a:t>
-            </a:r>
-            <a:endParaRPr lang="es-AR" sz="1350" dirty="0"/>
+              <a:t> manager :O</a:t>
+            </a:r>
           </a:p>
           <a:p>
             <a:r>
@@ -33877,16 +29776,11 @@
               <a:rPr lang="es-AR" sz="1350" dirty="0"/>
               <a:t>.</a:t>
             </a:r>
-            <a:endParaRPr lang="es-AR" sz="1350" dirty="0"/>
           </a:p>
           <a:p>
             <a:r>
               <a:rPr lang="es-AR" sz="1350" dirty="0"/>
-              <a:t>Todas las herramientas que vemos a continuación se instalan a través de NPM</a:t>
-            </a:r>
-            <a:r>
-              <a:rPr lang="es-AR" sz="1350" dirty="0"/>
-              <a:t>.</a:t>
+              <a:t>Todas las herramientas que vemos a continuación se instalan a través de NPM.</a:t>
             </a:r>
             <a:endParaRPr lang="en-US" sz="1350" dirty="0"/>
           </a:p>
@@ -34073,13 +29967,8 @@
             </a:r>
             <a:r>
               <a:rPr lang="es-AR" sz="1350" dirty="0"/>
-              <a:t> es una herramienta para automatizar tareas</a:t>
-            </a:r>
-            <a:r>
-              <a:rPr lang="es-AR" sz="1350" dirty="0"/>
-              <a:t>.</a:t>
-            </a:r>
-            <a:endParaRPr lang="es-AR" sz="1350" dirty="0"/>
+              <a:t> es una herramienta para automatizar tareas.</a:t>
+            </a:r>
           </a:p>
           <a:p>
             <a:r>
@@ -34108,11 +29997,7 @@
             </a:r>
             <a:r>
               <a:rPr lang="es-AR" sz="1350" dirty="0"/>
-              <a:t>, etc</a:t>
-            </a:r>
-            <a:r>
-              <a:rPr lang="es-AR" sz="1350" dirty="0"/>
-              <a:t>.</a:t>
+              <a:t>, etc.</a:t>
             </a:r>
           </a:p>
           <a:p>
@@ -34158,11 +30043,7 @@
             </a:r>
             <a:r>
               <a:rPr lang="en-US" sz="1350" dirty="0"/>
-              <a:t> el archive </a:t>
-            </a:r>
-            <a:r>
-              <a:rPr lang="en-US" sz="1350" dirty="0"/>
-              <a:t>Gruntfile.js</a:t>
+              <a:t> el archive Gruntfile.js</a:t>
             </a:r>
             <a:r>
               <a:rPr lang="es-AR" sz="1350" dirty="0"/>
@@ -34276,7 +30157,6 @@
               <a:rPr lang="es-AR" sz="1350" dirty="0"/>
               <a:t>.</a:t>
             </a:r>
-            <a:endParaRPr lang="es-AR" sz="1350" dirty="0"/>
           </a:p>
           <a:p>
             <a:r>
@@ -34844,7 +30724,6 @@
               <a:rPr lang="es-AR" sz="1350" dirty="0"/>
               <a:t>.</a:t>
             </a:r>
-            <a:endParaRPr lang="es-AR" sz="1350" dirty="0"/>
           </a:p>
           <a:p>
             <a:r>

</xml_diff>